<commit_message>
add presentation, driver, and notes of hdkcom
</commit_message>
<xml_diff>
--- a/Workshop/Presentasi/Hardware Design - Audio Codec.pptx
+++ b/Workshop/Presentasi/Hardware Design - Audio Codec.pptx
@@ -227,7 +227,7 @@
             <a:fld id="{7268BF31-A77F-443C-AB26-8730B613B8C5}" type="datetimeFigureOut">
               <a:rPr lang="id-ID" smtClean="0"/>
               <a:pPr/>
-              <a:t>10/11/2014</a:t>
+              <a:t>18/11/2014</a:t>
             </a:fld>
             <a:endParaRPr lang="id-ID" dirty="0"/>
           </a:p>
@@ -4492,9 +4492,133 @@
   <p:timing>
     <p:tnLst>
       <p:par>
-        <p:cTn id="1" dur="indefinite" restart="never" nodeType="tmRoot"/>
+        <p:cTn id="1" dur="indefinite" restart="never" nodeType="tmRoot">
+          <p:childTnLst>
+            <p:seq concurrent="1" nextAc="seek">
+              <p:cTn id="2" dur="indefinite" nodeType="mainSeq">
+                <p:childTnLst>
+                  <p:par>
+                    <p:cTn id="3" fill="hold">
+                      <p:stCondLst>
+                        <p:cond delay="indefinite"/>
+                      </p:stCondLst>
+                      <p:childTnLst>
+                        <p:par>
+                          <p:cTn id="4" fill="hold">
+                            <p:stCondLst>
+                              <p:cond delay="0"/>
+                            </p:stCondLst>
+                            <p:childTnLst>
+                              <p:par>
+                                <p:cTn id="5" presetID="1" presetClass="entr" presetSubtype="0" fill="hold" grpId="0" nodeType="clickEffect">
+                                  <p:stCondLst>
+                                    <p:cond delay="0"/>
+                                  </p:stCondLst>
+                                  <p:childTnLst>
+                                    <p:set>
+                                      <p:cBhvr>
+                                        <p:cTn id="6" dur="1" fill="hold">
+                                          <p:stCondLst>
+                                            <p:cond delay="0"/>
+                                          </p:stCondLst>
+                                        </p:cTn>
+                                        <p:tgtEl>
+                                          <p:spTgt spid="13">
+                                            <p:txEl>
+                                              <p:pRg st="0" end="0"/>
+                                            </p:txEl>
+                                          </p:spTgt>
+                                        </p:tgtEl>
+                                        <p:attrNameLst>
+                                          <p:attrName>style.visibility</p:attrName>
+                                        </p:attrNameLst>
+                                      </p:cBhvr>
+                                      <p:to>
+                                        <p:strVal val="visible"/>
+                                      </p:to>
+                                    </p:set>
+                                  </p:childTnLst>
+                                </p:cTn>
+                              </p:par>
+                            </p:childTnLst>
+                          </p:cTn>
+                        </p:par>
+                      </p:childTnLst>
+                    </p:cTn>
+                  </p:par>
+                  <p:par>
+                    <p:cTn id="7" fill="hold">
+                      <p:stCondLst>
+                        <p:cond delay="indefinite"/>
+                      </p:stCondLst>
+                      <p:childTnLst>
+                        <p:par>
+                          <p:cTn id="8" fill="hold">
+                            <p:stCondLst>
+                              <p:cond delay="0"/>
+                            </p:stCondLst>
+                            <p:childTnLst>
+                              <p:par>
+                                <p:cTn id="9" presetID="1" presetClass="entr" presetSubtype="0" fill="hold" grpId="0" nodeType="clickEffect">
+                                  <p:stCondLst>
+                                    <p:cond delay="0"/>
+                                  </p:stCondLst>
+                                  <p:childTnLst>
+                                    <p:set>
+                                      <p:cBhvr>
+                                        <p:cTn id="10" dur="1" fill="hold">
+                                          <p:stCondLst>
+                                            <p:cond delay="0"/>
+                                          </p:stCondLst>
+                                        </p:cTn>
+                                        <p:tgtEl>
+                                          <p:spTgt spid="13">
+                                            <p:txEl>
+                                              <p:pRg st="1" end="1"/>
+                                            </p:txEl>
+                                          </p:spTgt>
+                                        </p:tgtEl>
+                                        <p:attrNameLst>
+                                          <p:attrName>style.visibility</p:attrName>
+                                        </p:attrNameLst>
+                                      </p:cBhvr>
+                                      <p:to>
+                                        <p:strVal val="visible"/>
+                                      </p:to>
+                                    </p:set>
+                                  </p:childTnLst>
+                                </p:cTn>
+                              </p:par>
+                            </p:childTnLst>
+                          </p:cTn>
+                        </p:par>
+                      </p:childTnLst>
+                    </p:cTn>
+                  </p:par>
+                </p:childTnLst>
+              </p:cTn>
+              <p:prevCondLst>
+                <p:cond evt="onPrev" delay="0">
+                  <p:tgtEl>
+                    <p:sldTgt/>
+                  </p:tgtEl>
+                </p:cond>
+              </p:prevCondLst>
+              <p:nextCondLst>
+                <p:cond evt="onNext" delay="0">
+                  <p:tgtEl>
+                    <p:sldTgt/>
+                  </p:tgtEl>
+                </p:cond>
+              </p:nextCondLst>
+            </p:seq>
+          </p:childTnLst>
+        </p:cTn>
       </p:par>
     </p:tnLst>
+    <p:bldLst>
+      <p:bldP spid="13" grpId="0" build="p"/>
+    </p:bldLst>
   </p:timing>
 </p:sld>
 </file>
@@ -4647,9 +4771,133 @@
   <p:timing>
     <p:tnLst>
       <p:par>
-        <p:cTn id="1" dur="indefinite" restart="never" nodeType="tmRoot"/>
+        <p:cTn id="1" dur="indefinite" restart="never" nodeType="tmRoot">
+          <p:childTnLst>
+            <p:seq concurrent="1" nextAc="seek">
+              <p:cTn id="2" dur="indefinite" nodeType="mainSeq">
+                <p:childTnLst>
+                  <p:par>
+                    <p:cTn id="3" fill="hold">
+                      <p:stCondLst>
+                        <p:cond delay="indefinite"/>
+                      </p:stCondLst>
+                      <p:childTnLst>
+                        <p:par>
+                          <p:cTn id="4" fill="hold">
+                            <p:stCondLst>
+                              <p:cond delay="0"/>
+                            </p:stCondLst>
+                            <p:childTnLst>
+                              <p:par>
+                                <p:cTn id="5" presetID="1" presetClass="entr" presetSubtype="0" fill="hold" grpId="0" nodeType="clickEffect">
+                                  <p:stCondLst>
+                                    <p:cond delay="0"/>
+                                  </p:stCondLst>
+                                  <p:childTnLst>
+                                    <p:set>
+                                      <p:cBhvr>
+                                        <p:cTn id="6" dur="1" fill="hold">
+                                          <p:stCondLst>
+                                            <p:cond delay="0"/>
+                                          </p:stCondLst>
+                                        </p:cTn>
+                                        <p:tgtEl>
+                                          <p:spTgt spid="8">
+                                            <p:txEl>
+                                              <p:pRg st="0" end="0"/>
+                                            </p:txEl>
+                                          </p:spTgt>
+                                        </p:tgtEl>
+                                        <p:attrNameLst>
+                                          <p:attrName>style.visibility</p:attrName>
+                                        </p:attrNameLst>
+                                      </p:cBhvr>
+                                      <p:to>
+                                        <p:strVal val="visible"/>
+                                      </p:to>
+                                    </p:set>
+                                  </p:childTnLst>
+                                </p:cTn>
+                              </p:par>
+                            </p:childTnLst>
+                          </p:cTn>
+                        </p:par>
+                      </p:childTnLst>
+                    </p:cTn>
+                  </p:par>
+                  <p:par>
+                    <p:cTn id="7" fill="hold">
+                      <p:stCondLst>
+                        <p:cond delay="indefinite"/>
+                      </p:stCondLst>
+                      <p:childTnLst>
+                        <p:par>
+                          <p:cTn id="8" fill="hold">
+                            <p:stCondLst>
+                              <p:cond delay="0"/>
+                            </p:stCondLst>
+                            <p:childTnLst>
+                              <p:par>
+                                <p:cTn id="9" presetID="1" presetClass="entr" presetSubtype="0" fill="hold" grpId="0" nodeType="clickEffect">
+                                  <p:stCondLst>
+                                    <p:cond delay="0"/>
+                                  </p:stCondLst>
+                                  <p:childTnLst>
+                                    <p:set>
+                                      <p:cBhvr>
+                                        <p:cTn id="10" dur="1" fill="hold">
+                                          <p:stCondLst>
+                                            <p:cond delay="0"/>
+                                          </p:stCondLst>
+                                        </p:cTn>
+                                        <p:tgtEl>
+                                          <p:spTgt spid="8">
+                                            <p:txEl>
+                                              <p:pRg st="1" end="1"/>
+                                            </p:txEl>
+                                          </p:spTgt>
+                                        </p:tgtEl>
+                                        <p:attrNameLst>
+                                          <p:attrName>style.visibility</p:attrName>
+                                        </p:attrNameLst>
+                                      </p:cBhvr>
+                                      <p:to>
+                                        <p:strVal val="visible"/>
+                                      </p:to>
+                                    </p:set>
+                                  </p:childTnLst>
+                                </p:cTn>
+                              </p:par>
+                            </p:childTnLst>
+                          </p:cTn>
+                        </p:par>
+                      </p:childTnLst>
+                    </p:cTn>
+                  </p:par>
+                </p:childTnLst>
+              </p:cTn>
+              <p:prevCondLst>
+                <p:cond evt="onPrev" delay="0">
+                  <p:tgtEl>
+                    <p:sldTgt/>
+                  </p:tgtEl>
+                </p:cond>
+              </p:prevCondLst>
+              <p:nextCondLst>
+                <p:cond evt="onNext" delay="0">
+                  <p:tgtEl>
+                    <p:sldTgt/>
+                  </p:tgtEl>
+                </p:cond>
+              </p:nextCondLst>
+            </p:seq>
+          </p:childTnLst>
+        </p:cTn>
       </p:par>
     </p:tnLst>
+    <p:bldLst>
+      <p:bldP spid="8" grpId="0" build="p"/>
+    </p:bldLst>
   </p:timing>
 </p:sld>
 </file>
@@ -5019,9 +5267,584 @@
   <p:timing>
     <p:tnLst>
       <p:par>
-        <p:cTn id="1" dur="indefinite" restart="never" nodeType="tmRoot"/>
+        <p:cTn id="1" dur="indefinite" restart="never" nodeType="tmRoot">
+          <p:childTnLst>
+            <p:seq concurrent="1" nextAc="seek">
+              <p:cTn id="2" dur="indefinite" nodeType="mainSeq">
+                <p:childTnLst>
+                  <p:par>
+                    <p:cTn id="3" fill="hold">
+                      <p:stCondLst>
+                        <p:cond delay="indefinite"/>
+                      </p:stCondLst>
+                      <p:childTnLst>
+                        <p:par>
+                          <p:cTn id="4" fill="hold">
+                            <p:stCondLst>
+                              <p:cond delay="0"/>
+                            </p:stCondLst>
+                            <p:childTnLst>
+                              <p:par>
+                                <p:cTn id="5" presetID="1" presetClass="entr" presetSubtype="0" fill="hold" nodeType="clickEffect">
+                                  <p:stCondLst>
+                                    <p:cond delay="0"/>
+                                  </p:stCondLst>
+                                  <p:childTnLst>
+                                    <p:set>
+                                      <p:cBhvr>
+                                        <p:cTn id="6" dur="1" fill="hold">
+                                          <p:stCondLst>
+                                            <p:cond delay="0"/>
+                                          </p:stCondLst>
+                                        </p:cTn>
+                                        <p:tgtEl>
+                                          <p:spTgt spid="1026"/>
+                                        </p:tgtEl>
+                                        <p:attrNameLst>
+                                          <p:attrName>style.visibility</p:attrName>
+                                        </p:attrNameLst>
+                                      </p:cBhvr>
+                                      <p:to>
+                                        <p:strVal val="visible"/>
+                                      </p:to>
+                                    </p:set>
+                                  </p:childTnLst>
+                                </p:cTn>
+                              </p:par>
+                              <p:par>
+                                <p:cTn id="7" presetID="1" presetClass="entr" presetSubtype="0" fill="hold" grpId="0" nodeType="withEffect">
+                                  <p:stCondLst>
+                                    <p:cond delay="0"/>
+                                  </p:stCondLst>
+                                  <p:childTnLst>
+                                    <p:set>
+                                      <p:cBhvr>
+                                        <p:cTn id="8" dur="1" fill="hold">
+                                          <p:stCondLst>
+                                            <p:cond delay="0"/>
+                                          </p:stCondLst>
+                                        </p:cTn>
+                                        <p:tgtEl>
+                                          <p:spTgt spid="11"/>
+                                        </p:tgtEl>
+                                        <p:attrNameLst>
+                                          <p:attrName>style.visibility</p:attrName>
+                                        </p:attrNameLst>
+                                      </p:cBhvr>
+                                      <p:to>
+                                        <p:strVal val="visible"/>
+                                      </p:to>
+                                    </p:set>
+                                  </p:childTnLst>
+                                </p:cTn>
+                              </p:par>
+                            </p:childTnLst>
+                          </p:cTn>
+                        </p:par>
+                      </p:childTnLst>
+                    </p:cTn>
+                  </p:par>
+                  <p:par>
+                    <p:cTn id="9" fill="hold">
+                      <p:stCondLst>
+                        <p:cond delay="indefinite"/>
+                      </p:stCondLst>
+                      <p:childTnLst>
+                        <p:par>
+                          <p:cTn id="10" fill="hold">
+                            <p:stCondLst>
+                              <p:cond delay="0"/>
+                            </p:stCondLst>
+                            <p:childTnLst>
+                              <p:par>
+                                <p:cTn id="11" presetID="1" presetClass="entr" presetSubtype="0" fill="hold" grpId="0" nodeType="clickEffect">
+                                  <p:stCondLst>
+                                    <p:cond delay="0"/>
+                                  </p:stCondLst>
+                                  <p:childTnLst>
+                                    <p:set>
+                                      <p:cBhvr>
+                                        <p:cTn id="12" dur="1" fill="hold">
+                                          <p:stCondLst>
+                                            <p:cond delay="0"/>
+                                          </p:stCondLst>
+                                        </p:cTn>
+                                        <p:tgtEl>
+                                          <p:spTgt spid="10">
+                                            <p:txEl>
+                                              <p:pRg st="0" end="0"/>
+                                            </p:txEl>
+                                          </p:spTgt>
+                                        </p:tgtEl>
+                                        <p:attrNameLst>
+                                          <p:attrName>style.visibility</p:attrName>
+                                        </p:attrNameLst>
+                                      </p:cBhvr>
+                                      <p:to>
+                                        <p:strVal val="visible"/>
+                                      </p:to>
+                                    </p:set>
+                                  </p:childTnLst>
+                                </p:cTn>
+                              </p:par>
+                            </p:childTnLst>
+                          </p:cTn>
+                        </p:par>
+                      </p:childTnLst>
+                    </p:cTn>
+                  </p:par>
+                  <p:par>
+                    <p:cTn id="13" fill="hold">
+                      <p:stCondLst>
+                        <p:cond delay="indefinite"/>
+                      </p:stCondLst>
+                      <p:childTnLst>
+                        <p:par>
+                          <p:cTn id="14" fill="hold">
+                            <p:stCondLst>
+                              <p:cond delay="0"/>
+                            </p:stCondLst>
+                            <p:childTnLst>
+                              <p:par>
+                                <p:cTn id="15" presetID="1" presetClass="entr" presetSubtype="0" fill="hold" grpId="0" nodeType="clickEffect">
+                                  <p:stCondLst>
+                                    <p:cond delay="0"/>
+                                  </p:stCondLst>
+                                  <p:childTnLst>
+                                    <p:set>
+                                      <p:cBhvr>
+                                        <p:cTn id="16" dur="1" fill="hold">
+                                          <p:stCondLst>
+                                            <p:cond delay="0"/>
+                                          </p:stCondLst>
+                                        </p:cTn>
+                                        <p:tgtEl>
+                                          <p:spTgt spid="10">
+                                            <p:txEl>
+                                              <p:pRg st="1" end="1"/>
+                                            </p:txEl>
+                                          </p:spTgt>
+                                        </p:tgtEl>
+                                        <p:attrNameLst>
+                                          <p:attrName>style.visibility</p:attrName>
+                                        </p:attrNameLst>
+                                      </p:cBhvr>
+                                      <p:to>
+                                        <p:strVal val="visible"/>
+                                      </p:to>
+                                    </p:set>
+                                  </p:childTnLst>
+                                </p:cTn>
+                              </p:par>
+                            </p:childTnLst>
+                          </p:cTn>
+                        </p:par>
+                      </p:childTnLst>
+                    </p:cTn>
+                  </p:par>
+                  <p:par>
+                    <p:cTn id="17" fill="hold">
+                      <p:stCondLst>
+                        <p:cond delay="indefinite"/>
+                      </p:stCondLst>
+                      <p:childTnLst>
+                        <p:par>
+                          <p:cTn id="18" fill="hold">
+                            <p:stCondLst>
+                              <p:cond delay="0"/>
+                            </p:stCondLst>
+                            <p:childTnLst>
+                              <p:par>
+                                <p:cTn id="19" presetID="1" presetClass="entr" presetSubtype="0" fill="hold" grpId="0" nodeType="clickEffect">
+                                  <p:stCondLst>
+                                    <p:cond delay="0"/>
+                                  </p:stCondLst>
+                                  <p:childTnLst>
+                                    <p:set>
+                                      <p:cBhvr>
+                                        <p:cTn id="20" dur="1" fill="hold">
+                                          <p:stCondLst>
+                                            <p:cond delay="0"/>
+                                          </p:stCondLst>
+                                        </p:cTn>
+                                        <p:tgtEl>
+                                          <p:spTgt spid="10">
+                                            <p:txEl>
+                                              <p:pRg st="2" end="2"/>
+                                            </p:txEl>
+                                          </p:spTgt>
+                                        </p:tgtEl>
+                                        <p:attrNameLst>
+                                          <p:attrName>style.visibility</p:attrName>
+                                        </p:attrNameLst>
+                                      </p:cBhvr>
+                                      <p:to>
+                                        <p:strVal val="visible"/>
+                                      </p:to>
+                                    </p:set>
+                                  </p:childTnLst>
+                                </p:cTn>
+                              </p:par>
+                            </p:childTnLst>
+                          </p:cTn>
+                        </p:par>
+                      </p:childTnLst>
+                    </p:cTn>
+                  </p:par>
+                  <p:par>
+                    <p:cTn id="21" fill="hold">
+                      <p:stCondLst>
+                        <p:cond delay="indefinite"/>
+                      </p:stCondLst>
+                      <p:childTnLst>
+                        <p:par>
+                          <p:cTn id="22" fill="hold">
+                            <p:stCondLst>
+                              <p:cond delay="0"/>
+                            </p:stCondLst>
+                            <p:childTnLst>
+                              <p:par>
+                                <p:cTn id="23" presetID="1" presetClass="entr" presetSubtype="0" fill="hold" grpId="0" nodeType="clickEffect">
+                                  <p:stCondLst>
+                                    <p:cond delay="0"/>
+                                  </p:stCondLst>
+                                  <p:childTnLst>
+                                    <p:set>
+                                      <p:cBhvr>
+                                        <p:cTn id="24" dur="1" fill="hold">
+                                          <p:stCondLst>
+                                            <p:cond delay="0"/>
+                                          </p:stCondLst>
+                                        </p:cTn>
+                                        <p:tgtEl>
+                                          <p:spTgt spid="10">
+                                            <p:txEl>
+                                              <p:pRg st="3" end="3"/>
+                                            </p:txEl>
+                                          </p:spTgt>
+                                        </p:tgtEl>
+                                        <p:attrNameLst>
+                                          <p:attrName>style.visibility</p:attrName>
+                                        </p:attrNameLst>
+                                      </p:cBhvr>
+                                      <p:to>
+                                        <p:strVal val="visible"/>
+                                      </p:to>
+                                    </p:set>
+                                  </p:childTnLst>
+                                </p:cTn>
+                              </p:par>
+                            </p:childTnLst>
+                          </p:cTn>
+                        </p:par>
+                      </p:childTnLst>
+                    </p:cTn>
+                  </p:par>
+                  <p:par>
+                    <p:cTn id="25" fill="hold">
+                      <p:stCondLst>
+                        <p:cond delay="indefinite"/>
+                      </p:stCondLst>
+                      <p:childTnLst>
+                        <p:par>
+                          <p:cTn id="26" fill="hold">
+                            <p:stCondLst>
+                              <p:cond delay="0"/>
+                            </p:stCondLst>
+                            <p:childTnLst>
+                              <p:par>
+                                <p:cTn id="27" presetID="1" presetClass="entr" presetSubtype="0" fill="hold" grpId="0" nodeType="clickEffect">
+                                  <p:stCondLst>
+                                    <p:cond delay="0"/>
+                                  </p:stCondLst>
+                                  <p:childTnLst>
+                                    <p:set>
+                                      <p:cBhvr>
+                                        <p:cTn id="28" dur="1" fill="hold">
+                                          <p:stCondLst>
+                                            <p:cond delay="0"/>
+                                          </p:stCondLst>
+                                        </p:cTn>
+                                        <p:tgtEl>
+                                          <p:spTgt spid="10">
+                                            <p:txEl>
+                                              <p:pRg st="4" end="4"/>
+                                            </p:txEl>
+                                          </p:spTgt>
+                                        </p:tgtEl>
+                                        <p:attrNameLst>
+                                          <p:attrName>style.visibility</p:attrName>
+                                        </p:attrNameLst>
+                                      </p:cBhvr>
+                                      <p:to>
+                                        <p:strVal val="visible"/>
+                                      </p:to>
+                                    </p:set>
+                                  </p:childTnLst>
+                                </p:cTn>
+                              </p:par>
+                            </p:childTnLst>
+                          </p:cTn>
+                        </p:par>
+                      </p:childTnLst>
+                    </p:cTn>
+                  </p:par>
+                  <p:par>
+                    <p:cTn id="29" fill="hold">
+                      <p:stCondLst>
+                        <p:cond delay="indefinite"/>
+                      </p:stCondLst>
+                      <p:childTnLst>
+                        <p:par>
+                          <p:cTn id="30" fill="hold">
+                            <p:stCondLst>
+                              <p:cond delay="0"/>
+                            </p:stCondLst>
+                            <p:childTnLst>
+                              <p:par>
+                                <p:cTn id="31" presetID="1" presetClass="entr" presetSubtype="0" fill="hold" grpId="0" nodeType="clickEffect">
+                                  <p:stCondLst>
+                                    <p:cond delay="0"/>
+                                  </p:stCondLst>
+                                  <p:childTnLst>
+                                    <p:set>
+                                      <p:cBhvr>
+                                        <p:cTn id="32" dur="1" fill="hold">
+                                          <p:stCondLst>
+                                            <p:cond delay="0"/>
+                                          </p:stCondLst>
+                                        </p:cTn>
+                                        <p:tgtEl>
+                                          <p:spTgt spid="10">
+                                            <p:txEl>
+                                              <p:pRg st="5" end="5"/>
+                                            </p:txEl>
+                                          </p:spTgt>
+                                        </p:tgtEl>
+                                        <p:attrNameLst>
+                                          <p:attrName>style.visibility</p:attrName>
+                                        </p:attrNameLst>
+                                      </p:cBhvr>
+                                      <p:to>
+                                        <p:strVal val="visible"/>
+                                      </p:to>
+                                    </p:set>
+                                  </p:childTnLst>
+                                </p:cTn>
+                              </p:par>
+                            </p:childTnLst>
+                          </p:cTn>
+                        </p:par>
+                      </p:childTnLst>
+                    </p:cTn>
+                  </p:par>
+                  <p:par>
+                    <p:cTn id="33" fill="hold">
+                      <p:stCondLst>
+                        <p:cond delay="indefinite"/>
+                      </p:stCondLst>
+                      <p:childTnLst>
+                        <p:par>
+                          <p:cTn id="34" fill="hold">
+                            <p:stCondLst>
+                              <p:cond delay="0"/>
+                            </p:stCondLst>
+                            <p:childTnLst>
+                              <p:par>
+                                <p:cTn id="35" presetID="1" presetClass="entr" presetSubtype="0" fill="hold" grpId="0" nodeType="clickEffect">
+                                  <p:stCondLst>
+                                    <p:cond delay="0"/>
+                                  </p:stCondLst>
+                                  <p:childTnLst>
+                                    <p:set>
+                                      <p:cBhvr>
+                                        <p:cTn id="36" dur="1" fill="hold">
+                                          <p:stCondLst>
+                                            <p:cond delay="0"/>
+                                          </p:stCondLst>
+                                        </p:cTn>
+                                        <p:tgtEl>
+                                          <p:spTgt spid="16"/>
+                                        </p:tgtEl>
+                                        <p:attrNameLst>
+                                          <p:attrName>style.visibility</p:attrName>
+                                        </p:attrNameLst>
+                                      </p:cBhvr>
+                                      <p:to>
+                                        <p:strVal val="visible"/>
+                                      </p:to>
+                                    </p:set>
+                                  </p:childTnLst>
+                                </p:cTn>
+                              </p:par>
+                            </p:childTnLst>
+                          </p:cTn>
+                        </p:par>
+                      </p:childTnLst>
+                    </p:cTn>
+                  </p:par>
+                  <p:par>
+                    <p:cTn id="37" fill="hold">
+                      <p:stCondLst>
+                        <p:cond delay="indefinite"/>
+                      </p:stCondLst>
+                      <p:childTnLst>
+                        <p:par>
+                          <p:cTn id="38" fill="hold">
+                            <p:stCondLst>
+                              <p:cond delay="0"/>
+                            </p:stCondLst>
+                            <p:childTnLst>
+                              <p:par>
+                                <p:cTn id="39" presetID="1" presetClass="entr" presetSubtype="0" fill="hold" nodeType="clickEffect">
+                                  <p:stCondLst>
+                                    <p:cond delay="0"/>
+                                  </p:stCondLst>
+                                  <p:childTnLst>
+                                    <p:set>
+                                      <p:cBhvr>
+                                        <p:cTn id="40" dur="1" fill="hold">
+                                          <p:stCondLst>
+                                            <p:cond delay="0"/>
+                                          </p:stCondLst>
+                                        </p:cTn>
+                                        <p:tgtEl>
+                                          <p:spTgt spid="13"/>
+                                        </p:tgtEl>
+                                        <p:attrNameLst>
+                                          <p:attrName>style.visibility</p:attrName>
+                                        </p:attrNameLst>
+                                      </p:cBhvr>
+                                      <p:to>
+                                        <p:strVal val="visible"/>
+                                      </p:to>
+                                    </p:set>
+                                  </p:childTnLst>
+                                </p:cTn>
+                              </p:par>
+                            </p:childTnLst>
+                          </p:cTn>
+                        </p:par>
+                      </p:childTnLst>
+                    </p:cTn>
+                  </p:par>
+                  <p:par>
+                    <p:cTn id="41" fill="hold">
+                      <p:stCondLst>
+                        <p:cond delay="indefinite"/>
+                      </p:stCondLst>
+                      <p:childTnLst>
+                        <p:par>
+                          <p:cTn id="42" fill="hold">
+                            <p:stCondLst>
+                              <p:cond delay="0"/>
+                            </p:stCondLst>
+                            <p:childTnLst>
+                              <p:par>
+                                <p:cTn id="43" presetID="1" presetClass="entr" presetSubtype="0" fill="hold" grpId="0" nodeType="clickEffect">
+                                  <p:stCondLst>
+                                    <p:cond delay="0"/>
+                                  </p:stCondLst>
+                                  <p:childTnLst>
+                                    <p:set>
+                                      <p:cBhvr>
+                                        <p:cTn id="44" dur="1" fill="hold">
+                                          <p:stCondLst>
+                                            <p:cond delay="0"/>
+                                          </p:stCondLst>
+                                        </p:cTn>
+                                        <p:tgtEl>
+                                          <p:spTgt spid="17"/>
+                                        </p:tgtEl>
+                                        <p:attrNameLst>
+                                          <p:attrName>style.visibility</p:attrName>
+                                        </p:attrNameLst>
+                                      </p:cBhvr>
+                                      <p:to>
+                                        <p:strVal val="visible"/>
+                                      </p:to>
+                                    </p:set>
+                                  </p:childTnLst>
+                                </p:cTn>
+                              </p:par>
+                            </p:childTnLst>
+                          </p:cTn>
+                        </p:par>
+                      </p:childTnLst>
+                    </p:cTn>
+                  </p:par>
+                  <p:par>
+                    <p:cTn id="45" fill="hold">
+                      <p:stCondLst>
+                        <p:cond delay="indefinite"/>
+                      </p:stCondLst>
+                      <p:childTnLst>
+                        <p:par>
+                          <p:cTn id="46" fill="hold">
+                            <p:stCondLst>
+                              <p:cond delay="0"/>
+                            </p:stCondLst>
+                            <p:childTnLst>
+                              <p:par>
+                                <p:cTn id="47" presetID="1" presetClass="entr" presetSubtype="0" fill="hold" nodeType="clickEffect">
+                                  <p:stCondLst>
+                                    <p:cond delay="0"/>
+                                  </p:stCondLst>
+                                  <p:childTnLst>
+                                    <p:set>
+                                      <p:cBhvr>
+                                        <p:cTn id="48" dur="1" fill="hold">
+                                          <p:stCondLst>
+                                            <p:cond delay="0"/>
+                                          </p:stCondLst>
+                                        </p:cTn>
+                                        <p:tgtEl>
+                                          <p:spTgt spid="14"/>
+                                        </p:tgtEl>
+                                        <p:attrNameLst>
+                                          <p:attrName>style.visibility</p:attrName>
+                                        </p:attrNameLst>
+                                      </p:cBhvr>
+                                      <p:to>
+                                        <p:strVal val="visible"/>
+                                      </p:to>
+                                    </p:set>
+                                  </p:childTnLst>
+                                </p:cTn>
+                              </p:par>
+                            </p:childTnLst>
+                          </p:cTn>
+                        </p:par>
+                      </p:childTnLst>
+                    </p:cTn>
+                  </p:par>
+                </p:childTnLst>
+              </p:cTn>
+              <p:prevCondLst>
+                <p:cond evt="onPrev" delay="0">
+                  <p:tgtEl>
+                    <p:sldTgt/>
+                  </p:tgtEl>
+                </p:cond>
+              </p:prevCondLst>
+              <p:nextCondLst>
+                <p:cond evt="onNext" delay="0">
+                  <p:tgtEl>
+                    <p:sldTgt/>
+                  </p:tgtEl>
+                </p:cond>
+              </p:nextCondLst>
+            </p:seq>
+          </p:childTnLst>
+        </p:cTn>
       </p:par>
     </p:tnLst>
+    <p:bldLst>
+      <p:bldP spid="10" grpId="0" build="p"/>
+      <p:bldP spid="11" grpId="0"/>
+      <p:bldP spid="16" grpId="0"/>
+      <p:bldP spid="17" grpId="0"/>
+    </p:bldLst>
   </p:timing>
 </p:sld>
 </file>
@@ -5249,9 +6072,322 @@
   <p:timing>
     <p:tnLst>
       <p:par>
-        <p:cTn id="1" dur="indefinite" restart="never" nodeType="tmRoot"/>
+        <p:cTn id="1" dur="indefinite" restart="never" nodeType="tmRoot">
+          <p:childTnLst>
+            <p:seq concurrent="1" nextAc="seek">
+              <p:cTn id="2" dur="indefinite" nodeType="mainSeq">
+                <p:childTnLst>
+                  <p:par>
+                    <p:cTn id="3" fill="hold">
+                      <p:stCondLst>
+                        <p:cond delay="indefinite"/>
+                      </p:stCondLst>
+                      <p:childTnLst>
+                        <p:par>
+                          <p:cTn id="4" fill="hold">
+                            <p:stCondLst>
+                              <p:cond delay="0"/>
+                            </p:stCondLst>
+                            <p:childTnLst>
+                              <p:par>
+                                <p:cTn id="5" presetID="1" presetClass="entr" presetSubtype="0" fill="hold" grpId="0" nodeType="clickEffect">
+                                  <p:stCondLst>
+                                    <p:cond delay="0"/>
+                                  </p:stCondLst>
+                                  <p:childTnLst>
+                                    <p:set>
+                                      <p:cBhvr>
+                                        <p:cTn id="6" dur="1" fill="hold">
+                                          <p:stCondLst>
+                                            <p:cond delay="0"/>
+                                          </p:stCondLst>
+                                        </p:cTn>
+                                        <p:tgtEl>
+                                          <p:spTgt spid="12"/>
+                                        </p:tgtEl>
+                                        <p:attrNameLst>
+                                          <p:attrName>style.visibility</p:attrName>
+                                        </p:attrNameLst>
+                                      </p:cBhvr>
+                                      <p:to>
+                                        <p:strVal val="visible"/>
+                                      </p:to>
+                                    </p:set>
+                                  </p:childTnLst>
+                                </p:cTn>
+                              </p:par>
+                            </p:childTnLst>
+                          </p:cTn>
+                        </p:par>
+                      </p:childTnLst>
+                    </p:cTn>
+                  </p:par>
+                  <p:par>
+                    <p:cTn id="7" fill="hold">
+                      <p:stCondLst>
+                        <p:cond delay="indefinite"/>
+                      </p:stCondLst>
+                      <p:childTnLst>
+                        <p:par>
+                          <p:cTn id="8" fill="hold">
+                            <p:stCondLst>
+                              <p:cond delay="0"/>
+                            </p:stCondLst>
+                            <p:childTnLst>
+                              <p:par>
+                                <p:cTn id="9" presetID="1" presetClass="entr" presetSubtype="0" fill="hold" nodeType="clickEffect">
+                                  <p:stCondLst>
+                                    <p:cond delay="0"/>
+                                  </p:stCondLst>
+                                  <p:childTnLst>
+                                    <p:set>
+                                      <p:cBhvr>
+                                        <p:cTn id="10" dur="1" fill="hold">
+                                          <p:stCondLst>
+                                            <p:cond delay="0"/>
+                                          </p:stCondLst>
+                                        </p:cTn>
+                                        <p:tgtEl>
+                                          <p:spTgt spid="11"/>
+                                        </p:tgtEl>
+                                        <p:attrNameLst>
+                                          <p:attrName>style.visibility</p:attrName>
+                                        </p:attrNameLst>
+                                      </p:cBhvr>
+                                      <p:to>
+                                        <p:strVal val="visible"/>
+                                      </p:to>
+                                    </p:set>
+                                  </p:childTnLst>
+                                </p:cTn>
+                              </p:par>
+                            </p:childTnLst>
+                          </p:cTn>
+                        </p:par>
+                      </p:childTnLst>
+                    </p:cTn>
+                  </p:par>
+                  <p:par>
+                    <p:cTn id="11" fill="hold">
+                      <p:stCondLst>
+                        <p:cond delay="indefinite"/>
+                      </p:stCondLst>
+                      <p:childTnLst>
+                        <p:par>
+                          <p:cTn id="12" fill="hold">
+                            <p:stCondLst>
+                              <p:cond delay="0"/>
+                            </p:stCondLst>
+                            <p:childTnLst>
+                              <p:par>
+                                <p:cTn id="13" presetID="1" presetClass="entr" presetSubtype="0" fill="hold" grpId="0" nodeType="clickEffect">
+                                  <p:stCondLst>
+                                    <p:cond delay="0"/>
+                                  </p:stCondLst>
+                                  <p:childTnLst>
+                                    <p:set>
+                                      <p:cBhvr>
+                                        <p:cTn id="14" dur="1" fill="hold">
+                                          <p:stCondLst>
+                                            <p:cond delay="0"/>
+                                          </p:stCondLst>
+                                        </p:cTn>
+                                        <p:tgtEl>
+                                          <p:spTgt spid="10">
+                                            <p:txEl>
+                                              <p:pRg st="0" end="0"/>
+                                            </p:txEl>
+                                          </p:spTgt>
+                                        </p:tgtEl>
+                                        <p:attrNameLst>
+                                          <p:attrName>style.visibility</p:attrName>
+                                        </p:attrNameLst>
+                                      </p:cBhvr>
+                                      <p:to>
+                                        <p:strVal val="visible"/>
+                                      </p:to>
+                                    </p:set>
+                                  </p:childTnLst>
+                                </p:cTn>
+                              </p:par>
+                            </p:childTnLst>
+                          </p:cTn>
+                        </p:par>
+                      </p:childTnLst>
+                    </p:cTn>
+                  </p:par>
+                  <p:par>
+                    <p:cTn id="15" fill="hold">
+                      <p:stCondLst>
+                        <p:cond delay="indefinite"/>
+                      </p:stCondLst>
+                      <p:childTnLst>
+                        <p:par>
+                          <p:cTn id="16" fill="hold">
+                            <p:stCondLst>
+                              <p:cond delay="0"/>
+                            </p:stCondLst>
+                            <p:childTnLst>
+                              <p:par>
+                                <p:cTn id="17" presetID="1" presetClass="entr" presetSubtype="0" fill="hold" grpId="0" nodeType="clickEffect">
+                                  <p:stCondLst>
+                                    <p:cond delay="0"/>
+                                  </p:stCondLst>
+                                  <p:childTnLst>
+                                    <p:set>
+                                      <p:cBhvr>
+                                        <p:cTn id="18" dur="1" fill="hold">
+                                          <p:stCondLst>
+                                            <p:cond delay="0"/>
+                                          </p:stCondLst>
+                                        </p:cTn>
+                                        <p:tgtEl>
+                                          <p:spTgt spid="10">
+                                            <p:txEl>
+                                              <p:pRg st="1" end="1"/>
+                                            </p:txEl>
+                                          </p:spTgt>
+                                        </p:tgtEl>
+                                        <p:attrNameLst>
+                                          <p:attrName>style.visibility</p:attrName>
+                                        </p:attrNameLst>
+                                      </p:cBhvr>
+                                      <p:to>
+                                        <p:strVal val="visible"/>
+                                      </p:to>
+                                    </p:set>
+                                  </p:childTnLst>
+                                </p:cTn>
+                              </p:par>
+                            </p:childTnLst>
+                          </p:cTn>
+                        </p:par>
+                      </p:childTnLst>
+                    </p:cTn>
+                  </p:par>
+                  <p:par>
+                    <p:cTn id="19" fill="hold">
+                      <p:stCondLst>
+                        <p:cond delay="indefinite"/>
+                      </p:stCondLst>
+                      <p:childTnLst>
+                        <p:par>
+                          <p:cTn id="20" fill="hold">
+                            <p:stCondLst>
+                              <p:cond delay="0"/>
+                            </p:stCondLst>
+                            <p:childTnLst>
+                              <p:par>
+                                <p:cTn id="21" presetID="1" presetClass="entr" presetSubtype="0" fill="hold" grpId="0" nodeType="clickEffect">
+                                  <p:stCondLst>
+                                    <p:cond delay="0"/>
+                                  </p:stCondLst>
+                                  <p:childTnLst>
+                                    <p:set>
+                                      <p:cBhvr>
+                                        <p:cTn id="22" dur="1" fill="hold">
+                                          <p:stCondLst>
+                                            <p:cond delay="0"/>
+                                          </p:stCondLst>
+                                        </p:cTn>
+                                        <p:tgtEl>
+                                          <p:spTgt spid="10">
+                                            <p:txEl>
+                                              <p:pRg st="2" end="2"/>
+                                            </p:txEl>
+                                          </p:spTgt>
+                                        </p:tgtEl>
+                                        <p:attrNameLst>
+                                          <p:attrName>style.visibility</p:attrName>
+                                        </p:attrNameLst>
+                                      </p:cBhvr>
+                                      <p:to>
+                                        <p:strVal val="visible"/>
+                                      </p:to>
+                                    </p:set>
+                                  </p:childTnLst>
+                                </p:cTn>
+                              </p:par>
+                            </p:childTnLst>
+                          </p:cTn>
+                        </p:par>
+                      </p:childTnLst>
+                    </p:cTn>
+                  </p:par>
+                  <p:par>
+                    <p:cTn id="23" fill="hold">
+                      <p:stCondLst>
+                        <p:cond delay="indefinite"/>
+                      </p:stCondLst>
+                      <p:childTnLst>
+                        <p:par>
+                          <p:cTn id="24" fill="hold">
+                            <p:stCondLst>
+                              <p:cond delay="0"/>
+                            </p:stCondLst>
+                            <p:childTnLst>
+                              <p:par>
+                                <p:cTn id="25" presetID="1" presetClass="entr" presetSubtype="0" fill="hold" grpId="0" nodeType="clickEffect">
+                                  <p:stCondLst>
+                                    <p:cond delay="0"/>
+                                  </p:stCondLst>
+                                  <p:childTnLst>
+                                    <p:set>
+                                      <p:cBhvr>
+                                        <p:cTn id="26" dur="1" fill="hold">
+                                          <p:stCondLst>
+                                            <p:cond delay="0"/>
+                                          </p:stCondLst>
+                                        </p:cTn>
+                                        <p:tgtEl>
+                                          <p:spTgt spid="10">
+                                            <p:txEl>
+                                              <p:pRg st="3" end="3"/>
+                                            </p:txEl>
+                                          </p:spTgt>
+                                        </p:tgtEl>
+                                        <p:attrNameLst>
+                                          <p:attrName>style.visibility</p:attrName>
+                                        </p:attrNameLst>
+                                      </p:cBhvr>
+                                      <p:to>
+                                        <p:strVal val="visible"/>
+                                      </p:to>
+                                    </p:set>
+                                  </p:childTnLst>
+                                </p:cTn>
+                              </p:par>
+                            </p:childTnLst>
+                          </p:cTn>
+                        </p:par>
+                      </p:childTnLst>
+                    </p:cTn>
+                  </p:par>
+                </p:childTnLst>
+              </p:cTn>
+              <p:prevCondLst>
+                <p:cond evt="onPrev" delay="0">
+                  <p:tgtEl>
+                    <p:sldTgt/>
+                  </p:tgtEl>
+                </p:cond>
+              </p:prevCondLst>
+              <p:nextCondLst>
+                <p:cond evt="onNext" delay="0">
+                  <p:tgtEl>
+                    <p:sldTgt/>
+                  </p:tgtEl>
+                </p:cond>
+              </p:nextCondLst>
+            </p:seq>
+          </p:childTnLst>
+        </p:cTn>
       </p:par>
     </p:tnLst>
+    <p:bldLst>
+      <p:bldP spid="10" grpId="0" build="p"/>
+      <p:bldP spid="12" grpId="0"/>
+    </p:bldLst>
   </p:timing>
 </p:sld>
 </file>
@@ -5509,9 +6645,420 @@
   <p:timing>
     <p:tnLst>
       <p:par>
-        <p:cTn id="1" dur="indefinite" restart="never" nodeType="tmRoot"/>
+        <p:cTn id="1" dur="indefinite" restart="never" nodeType="tmRoot">
+          <p:childTnLst>
+            <p:seq concurrent="1" nextAc="seek">
+              <p:cTn id="2" dur="indefinite" nodeType="mainSeq">
+                <p:childTnLst>
+                  <p:par>
+                    <p:cTn id="3" fill="hold">
+                      <p:stCondLst>
+                        <p:cond delay="indefinite"/>
+                      </p:stCondLst>
+                      <p:childTnLst>
+                        <p:par>
+                          <p:cTn id="4" fill="hold">
+                            <p:stCondLst>
+                              <p:cond delay="0"/>
+                            </p:stCondLst>
+                            <p:childTnLst>
+                              <p:par>
+                                <p:cTn id="5" presetID="1" presetClass="entr" presetSubtype="0" fill="hold" grpId="0" nodeType="clickEffect">
+                                  <p:stCondLst>
+                                    <p:cond delay="0"/>
+                                  </p:stCondLst>
+                                  <p:childTnLst>
+                                    <p:set>
+                                      <p:cBhvr>
+                                        <p:cTn id="6" dur="1" fill="hold">
+                                          <p:stCondLst>
+                                            <p:cond delay="0"/>
+                                          </p:stCondLst>
+                                        </p:cTn>
+                                        <p:tgtEl>
+                                          <p:spTgt spid="9"/>
+                                        </p:tgtEl>
+                                        <p:attrNameLst>
+                                          <p:attrName>style.visibility</p:attrName>
+                                        </p:attrNameLst>
+                                      </p:cBhvr>
+                                      <p:to>
+                                        <p:strVal val="visible"/>
+                                      </p:to>
+                                    </p:set>
+                                  </p:childTnLst>
+                                </p:cTn>
+                              </p:par>
+                            </p:childTnLst>
+                          </p:cTn>
+                        </p:par>
+                      </p:childTnLst>
+                    </p:cTn>
+                  </p:par>
+                  <p:par>
+                    <p:cTn id="7" fill="hold">
+                      <p:stCondLst>
+                        <p:cond delay="indefinite"/>
+                      </p:stCondLst>
+                      <p:childTnLst>
+                        <p:par>
+                          <p:cTn id="8" fill="hold">
+                            <p:stCondLst>
+                              <p:cond delay="0"/>
+                            </p:stCondLst>
+                            <p:childTnLst>
+                              <p:par>
+                                <p:cTn id="9" presetID="1" presetClass="entr" presetSubtype="0" fill="hold" nodeType="clickEffect">
+                                  <p:stCondLst>
+                                    <p:cond delay="0"/>
+                                  </p:stCondLst>
+                                  <p:childTnLst>
+                                    <p:set>
+                                      <p:cBhvr>
+                                        <p:cTn id="10" dur="1" fill="hold">
+                                          <p:stCondLst>
+                                            <p:cond delay="0"/>
+                                          </p:stCondLst>
+                                        </p:cTn>
+                                        <p:tgtEl>
+                                          <p:spTgt spid="2050"/>
+                                        </p:tgtEl>
+                                        <p:attrNameLst>
+                                          <p:attrName>style.visibility</p:attrName>
+                                        </p:attrNameLst>
+                                      </p:cBhvr>
+                                      <p:to>
+                                        <p:strVal val="visible"/>
+                                      </p:to>
+                                    </p:set>
+                                  </p:childTnLst>
+                                </p:cTn>
+                              </p:par>
+                            </p:childTnLst>
+                          </p:cTn>
+                        </p:par>
+                      </p:childTnLst>
+                    </p:cTn>
+                  </p:par>
+                  <p:par>
+                    <p:cTn id="11" fill="hold">
+                      <p:stCondLst>
+                        <p:cond delay="indefinite"/>
+                      </p:stCondLst>
+                      <p:childTnLst>
+                        <p:par>
+                          <p:cTn id="12" fill="hold">
+                            <p:stCondLst>
+                              <p:cond delay="0"/>
+                            </p:stCondLst>
+                            <p:childTnLst>
+                              <p:par>
+                                <p:cTn id="13" presetID="1" presetClass="entr" presetSubtype="0" fill="hold" grpId="0" nodeType="clickEffect">
+                                  <p:stCondLst>
+                                    <p:cond delay="0"/>
+                                  </p:stCondLst>
+                                  <p:childTnLst>
+                                    <p:set>
+                                      <p:cBhvr>
+                                        <p:cTn id="14" dur="1" fill="hold">
+                                          <p:stCondLst>
+                                            <p:cond delay="0"/>
+                                          </p:stCondLst>
+                                        </p:cTn>
+                                        <p:tgtEl>
+                                          <p:spTgt spid="4">
+                                            <p:txEl>
+                                              <p:pRg st="0" end="0"/>
+                                            </p:txEl>
+                                          </p:spTgt>
+                                        </p:tgtEl>
+                                        <p:attrNameLst>
+                                          <p:attrName>style.visibility</p:attrName>
+                                        </p:attrNameLst>
+                                      </p:cBhvr>
+                                      <p:to>
+                                        <p:strVal val="visible"/>
+                                      </p:to>
+                                    </p:set>
+                                  </p:childTnLst>
+                                </p:cTn>
+                              </p:par>
+                            </p:childTnLst>
+                          </p:cTn>
+                        </p:par>
+                      </p:childTnLst>
+                    </p:cTn>
+                  </p:par>
+                  <p:par>
+                    <p:cTn id="15" fill="hold">
+                      <p:stCondLst>
+                        <p:cond delay="indefinite"/>
+                      </p:stCondLst>
+                      <p:childTnLst>
+                        <p:par>
+                          <p:cTn id="16" fill="hold">
+                            <p:stCondLst>
+                              <p:cond delay="0"/>
+                            </p:stCondLst>
+                            <p:childTnLst>
+                              <p:par>
+                                <p:cTn id="17" presetID="1" presetClass="entr" presetSubtype="0" fill="hold" grpId="0" nodeType="clickEffect">
+                                  <p:stCondLst>
+                                    <p:cond delay="0"/>
+                                  </p:stCondLst>
+                                  <p:childTnLst>
+                                    <p:set>
+                                      <p:cBhvr>
+                                        <p:cTn id="18" dur="1" fill="hold">
+                                          <p:stCondLst>
+                                            <p:cond delay="0"/>
+                                          </p:stCondLst>
+                                        </p:cTn>
+                                        <p:tgtEl>
+                                          <p:spTgt spid="4">
+                                            <p:txEl>
+                                              <p:pRg st="1" end="1"/>
+                                            </p:txEl>
+                                          </p:spTgt>
+                                        </p:tgtEl>
+                                        <p:attrNameLst>
+                                          <p:attrName>style.visibility</p:attrName>
+                                        </p:attrNameLst>
+                                      </p:cBhvr>
+                                      <p:to>
+                                        <p:strVal val="visible"/>
+                                      </p:to>
+                                    </p:set>
+                                  </p:childTnLst>
+                                </p:cTn>
+                              </p:par>
+                            </p:childTnLst>
+                          </p:cTn>
+                        </p:par>
+                      </p:childTnLst>
+                    </p:cTn>
+                  </p:par>
+                  <p:par>
+                    <p:cTn id="19" fill="hold">
+                      <p:stCondLst>
+                        <p:cond delay="indefinite"/>
+                      </p:stCondLst>
+                      <p:childTnLst>
+                        <p:par>
+                          <p:cTn id="20" fill="hold">
+                            <p:stCondLst>
+                              <p:cond delay="0"/>
+                            </p:stCondLst>
+                            <p:childTnLst>
+                              <p:par>
+                                <p:cTn id="21" presetID="1" presetClass="entr" presetSubtype="0" fill="hold" grpId="0" nodeType="clickEffect">
+                                  <p:stCondLst>
+                                    <p:cond delay="0"/>
+                                  </p:stCondLst>
+                                  <p:childTnLst>
+                                    <p:set>
+                                      <p:cBhvr>
+                                        <p:cTn id="22" dur="1" fill="hold">
+                                          <p:stCondLst>
+                                            <p:cond delay="0"/>
+                                          </p:stCondLst>
+                                        </p:cTn>
+                                        <p:tgtEl>
+                                          <p:spTgt spid="4">
+                                            <p:txEl>
+                                              <p:pRg st="2" end="2"/>
+                                            </p:txEl>
+                                          </p:spTgt>
+                                        </p:tgtEl>
+                                        <p:attrNameLst>
+                                          <p:attrName>style.visibility</p:attrName>
+                                        </p:attrNameLst>
+                                      </p:cBhvr>
+                                      <p:to>
+                                        <p:strVal val="visible"/>
+                                      </p:to>
+                                    </p:set>
+                                  </p:childTnLst>
+                                </p:cTn>
+                              </p:par>
+                            </p:childTnLst>
+                          </p:cTn>
+                        </p:par>
+                      </p:childTnLst>
+                    </p:cTn>
+                  </p:par>
+                  <p:par>
+                    <p:cTn id="23" fill="hold">
+                      <p:stCondLst>
+                        <p:cond delay="indefinite"/>
+                      </p:stCondLst>
+                      <p:childTnLst>
+                        <p:par>
+                          <p:cTn id="24" fill="hold">
+                            <p:stCondLst>
+                              <p:cond delay="0"/>
+                            </p:stCondLst>
+                            <p:childTnLst>
+                              <p:par>
+                                <p:cTn id="25" presetID="1" presetClass="entr" presetSubtype="0" fill="hold" grpId="0" nodeType="clickEffect">
+                                  <p:stCondLst>
+                                    <p:cond delay="0"/>
+                                  </p:stCondLst>
+                                  <p:childTnLst>
+                                    <p:set>
+                                      <p:cBhvr>
+                                        <p:cTn id="26" dur="1" fill="hold">
+                                          <p:stCondLst>
+                                            <p:cond delay="0"/>
+                                          </p:stCondLst>
+                                        </p:cTn>
+                                        <p:tgtEl>
+                                          <p:spTgt spid="4">
+                                            <p:txEl>
+                                              <p:pRg st="3" end="3"/>
+                                            </p:txEl>
+                                          </p:spTgt>
+                                        </p:tgtEl>
+                                        <p:attrNameLst>
+                                          <p:attrName>style.visibility</p:attrName>
+                                        </p:attrNameLst>
+                                      </p:cBhvr>
+                                      <p:to>
+                                        <p:strVal val="visible"/>
+                                      </p:to>
+                                    </p:set>
+                                  </p:childTnLst>
+                                </p:cTn>
+                              </p:par>
+                            </p:childTnLst>
+                          </p:cTn>
+                        </p:par>
+                      </p:childTnLst>
+                    </p:cTn>
+                  </p:par>
+                  <p:par>
+                    <p:cTn id="27" fill="hold">
+                      <p:stCondLst>
+                        <p:cond delay="indefinite"/>
+                      </p:stCondLst>
+                      <p:childTnLst>
+                        <p:par>
+                          <p:cTn id="28" fill="hold">
+                            <p:stCondLst>
+                              <p:cond delay="0"/>
+                            </p:stCondLst>
+                            <p:childTnLst>
+                              <p:par>
+                                <p:cTn id="29" presetID="1" presetClass="entr" presetSubtype="0" fill="hold" grpId="0" nodeType="clickEffect">
+                                  <p:stCondLst>
+                                    <p:cond delay="0"/>
+                                  </p:stCondLst>
+                                  <p:childTnLst>
+                                    <p:set>
+                                      <p:cBhvr>
+                                        <p:cTn id="30" dur="1" fill="hold">
+                                          <p:stCondLst>
+                                            <p:cond delay="0"/>
+                                          </p:stCondLst>
+                                        </p:cTn>
+                                        <p:tgtEl>
+                                          <p:spTgt spid="4">
+                                            <p:txEl>
+                                              <p:pRg st="4" end="4"/>
+                                            </p:txEl>
+                                          </p:spTgt>
+                                        </p:tgtEl>
+                                        <p:attrNameLst>
+                                          <p:attrName>style.visibility</p:attrName>
+                                        </p:attrNameLst>
+                                      </p:cBhvr>
+                                      <p:to>
+                                        <p:strVal val="visible"/>
+                                      </p:to>
+                                    </p:set>
+                                  </p:childTnLst>
+                                </p:cTn>
+                              </p:par>
+                            </p:childTnLst>
+                          </p:cTn>
+                        </p:par>
+                      </p:childTnLst>
+                    </p:cTn>
+                  </p:par>
+                  <p:par>
+                    <p:cTn id="31" fill="hold">
+                      <p:stCondLst>
+                        <p:cond delay="indefinite"/>
+                      </p:stCondLst>
+                      <p:childTnLst>
+                        <p:par>
+                          <p:cTn id="32" fill="hold">
+                            <p:stCondLst>
+                              <p:cond delay="0"/>
+                            </p:stCondLst>
+                            <p:childTnLst>
+                              <p:par>
+                                <p:cTn id="33" presetID="1" presetClass="entr" presetSubtype="0" fill="hold" grpId="0" nodeType="clickEffect">
+                                  <p:stCondLst>
+                                    <p:cond delay="0"/>
+                                  </p:stCondLst>
+                                  <p:childTnLst>
+                                    <p:set>
+                                      <p:cBhvr>
+                                        <p:cTn id="34" dur="1" fill="hold">
+                                          <p:stCondLst>
+                                            <p:cond delay="0"/>
+                                          </p:stCondLst>
+                                        </p:cTn>
+                                        <p:tgtEl>
+                                          <p:spTgt spid="4">
+                                            <p:txEl>
+                                              <p:pRg st="5" end="5"/>
+                                            </p:txEl>
+                                          </p:spTgt>
+                                        </p:tgtEl>
+                                        <p:attrNameLst>
+                                          <p:attrName>style.visibility</p:attrName>
+                                        </p:attrNameLst>
+                                      </p:cBhvr>
+                                      <p:to>
+                                        <p:strVal val="visible"/>
+                                      </p:to>
+                                    </p:set>
+                                  </p:childTnLst>
+                                </p:cTn>
+                              </p:par>
+                            </p:childTnLst>
+                          </p:cTn>
+                        </p:par>
+                      </p:childTnLst>
+                    </p:cTn>
+                  </p:par>
+                </p:childTnLst>
+              </p:cTn>
+              <p:prevCondLst>
+                <p:cond evt="onPrev" delay="0">
+                  <p:tgtEl>
+                    <p:sldTgt/>
+                  </p:tgtEl>
+                </p:cond>
+              </p:prevCondLst>
+              <p:nextCondLst>
+                <p:cond evt="onNext" delay="0">
+                  <p:tgtEl>
+                    <p:sldTgt/>
+                  </p:tgtEl>
+                </p:cond>
+              </p:nextCondLst>
+            </p:seq>
+          </p:childTnLst>
+        </p:cTn>
       </p:par>
     </p:tnLst>
+    <p:bldLst>
+      <p:bldP spid="4" grpId="0" build="p"/>
+      <p:bldP spid="9" grpId="0"/>
+    </p:bldLst>
   </p:timing>
 </p:sld>
 </file>
@@ -5736,9 +7283,322 @@
   <p:timing>
     <p:tnLst>
       <p:par>
-        <p:cTn id="1" dur="indefinite" restart="never" nodeType="tmRoot"/>
+        <p:cTn id="1" dur="indefinite" restart="never" nodeType="tmRoot">
+          <p:childTnLst>
+            <p:seq concurrent="1" nextAc="seek">
+              <p:cTn id="2" dur="indefinite" nodeType="mainSeq">
+                <p:childTnLst>
+                  <p:par>
+                    <p:cTn id="3" fill="hold">
+                      <p:stCondLst>
+                        <p:cond delay="indefinite"/>
+                      </p:stCondLst>
+                      <p:childTnLst>
+                        <p:par>
+                          <p:cTn id="4" fill="hold">
+                            <p:stCondLst>
+                              <p:cond delay="0"/>
+                            </p:stCondLst>
+                            <p:childTnLst>
+                              <p:par>
+                                <p:cTn id="5" presetID="1" presetClass="entr" presetSubtype="0" fill="hold" grpId="0" nodeType="clickEffect">
+                                  <p:stCondLst>
+                                    <p:cond delay="0"/>
+                                  </p:stCondLst>
+                                  <p:childTnLst>
+                                    <p:set>
+                                      <p:cBhvr>
+                                        <p:cTn id="6" dur="1" fill="hold">
+                                          <p:stCondLst>
+                                            <p:cond delay="0"/>
+                                          </p:stCondLst>
+                                        </p:cTn>
+                                        <p:tgtEl>
+                                          <p:spTgt spid="9"/>
+                                        </p:tgtEl>
+                                        <p:attrNameLst>
+                                          <p:attrName>style.visibility</p:attrName>
+                                        </p:attrNameLst>
+                                      </p:cBhvr>
+                                      <p:to>
+                                        <p:strVal val="visible"/>
+                                      </p:to>
+                                    </p:set>
+                                  </p:childTnLst>
+                                </p:cTn>
+                              </p:par>
+                            </p:childTnLst>
+                          </p:cTn>
+                        </p:par>
+                      </p:childTnLst>
+                    </p:cTn>
+                  </p:par>
+                  <p:par>
+                    <p:cTn id="7" fill="hold">
+                      <p:stCondLst>
+                        <p:cond delay="indefinite"/>
+                      </p:stCondLst>
+                      <p:childTnLst>
+                        <p:par>
+                          <p:cTn id="8" fill="hold">
+                            <p:stCondLst>
+                              <p:cond delay="0"/>
+                            </p:stCondLst>
+                            <p:childTnLst>
+                              <p:par>
+                                <p:cTn id="9" presetID="1" presetClass="entr" presetSubtype="0" fill="hold" nodeType="clickEffect">
+                                  <p:stCondLst>
+                                    <p:cond delay="0"/>
+                                  </p:stCondLst>
+                                  <p:childTnLst>
+                                    <p:set>
+                                      <p:cBhvr>
+                                        <p:cTn id="10" dur="1" fill="hold">
+                                          <p:stCondLst>
+                                            <p:cond delay="0"/>
+                                          </p:stCondLst>
+                                        </p:cTn>
+                                        <p:tgtEl>
+                                          <p:spTgt spid="8"/>
+                                        </p:tgtEl>
+                                        <p:attrNameLst>
+                                          <p:attrName>style.visibility</p:attrName>
+                                        </p:attrNameLst>
+                                      </p:cBhvr>
+                                      <p:to>
+                                        <p:strVal val="visible"/>
+                                      </p:to>
+                                    </p:set>
+                                  </p:childTnLst>
+                                </p:cTn>
+                              </p:par>
+                            </p:childTnLst>
+                          </p:cTn>
+                        </p:par>
+                      </p:childTnLst>
+                    </p:cTn>
+                  </p:par>
+                  <p:par>
+                    <p:cTn id="11" fill="hold">
+                      <p:stCondLst>
+                        <p:cond delay="indefinite"/>
+                      </p:stCondLst>
+                      <p:childTnLst>
+                        <p:par>
+                          <p:cTn id="12" fill="hold">
+                            <p:stCondLst>
+                              <p:cond delay="0"/>
+                            </p:stCondLst>
+                            <p:childTnLst>
+                              <p:par>
+                                <p:cTn id="13" presetID="1" presetClass="entr" presetSubtype="0" fill="hold" grpId="0" nodeType="clickEffect">
+                                  <p:stCondLst>
+                                    <p:cond delay="0"/>
+                                  </p:stCondLst>
+                                  <p:childTnLst>
+                                    <p:set>
+                                      <p:cBhvr>
+                                        <p:cTn id="14" dur="1" fill="hold">
+                                          <p:stCondLst>
+                                            <p:cond delay="0"/>
+                                          </p:stCondLst>
+                                        </p:cTn>
+                                        <p:tgtEl>
+                                          <p:spTgt spid="4">
+                                            <p:txEl>
+                                              <p:pRg st="0" end="0"/>
+                                            </p:txEl>
+                                          </p:spTgt>
+                                        </p:tgtEl>
+                                        <p:attrNameLst>
+                                          <p:attrName>style.visibility</p:attrName>
+                                        </p:attrNameLst>
+                                      </p:cBhvr>
+                                      <p:to>
+                                        <p:strVal val="visible"/>
+                                      </p:to>
+                                    </p:set>
+                                  </p:childTnLst>
+                                </p:cTn>
+                              </p:par>
+                            </p:childTnLst>
+                          </p:cTn>
+                        </p:par>
+                      </p:childTnLst>
+                    </p:cTn>
+                  </p:par>
+                  <p:par>
+                    <p:cTn id="15" fill="hold">
+                      <p:stCondLst>
+                        <p:cond delay="indefinite"/>
+                      </p:stCondLst>
+                      <p:childTnLst>
+                        <p:par>
+                          <p:cTn id="16" fill="hold">
+                            <p:stCondLst>
+                              <p:cond delay="0"/>
+                            </p:stCondLst>
+                            <p:childTnLst>
+                              <p:par>
+                                <p:cTn id="17" presetID="1" presetClass="entr" presetSubtype="0" fill="hold" grpId="0" nodeType="clickEffect">
+                                  <p:stCondLst>
+                                    <p:cond delay="0"/>
+                                  </p:stCondLst>
+                                  <p:childTnLst>
+                                    <p:set>
+                                      <p:cBhvr>
+                                        <p:cTn id="18" dur="1" fill="hold">
+                                          <p:stCondLst>
+                                            <p:cond delay="0"/>
+                                          </p:stCondLst>
+                                        </p:cTn>
+                                        <p:tgtEl>
+                                          <p:spTgt spid="4">
+                                            <p:txEl>
+                                              <p:pRg st="1" end="1"/>
+                                            </p:txEl>
+                                          </p:spTgt>
+                                        </p:tgtEl>
+                                        <p:attrNameLst>
+                                          <p:attrName>style.visibility</p:attrName>
+                                        </p:attrNameLst>
+                                      </p:cBhvr>
+                                      <p:to>
+                                        <p:strVal val="visible"/>
+                                      </p:to>
+                                    </p:set>
+                                  </p:childTnLst>
+                                </p:cTn>
+                              </p:par>
+                            </p:childTnLst>
+                          </p:cTn>
+                        </p:par>
+                      </p:childTnLst>
+                    </p:cTn>
+                  </p:par>
+                  <p:par>
+                    <p:cTn id="19" fill="hold">
+                      <p:stCondLst>
+                        <p:cond delay="indefinite"/>
+                      </p:stCondLst>
+                      <p:childTnLst>
+                        <p:par>
+                          <p:cTn id="20" fill="hold">
+                            <p:stCondLst>
+                              <p:cond delay="0"/>
+                            </p:stCondLst>
+                            <p:childTnLst>
+                              <p:par>
+                                <p:cTn id="21" presetID="1" presetClass="entr" presetSubtype="0" fill="hold" grpId="0" nodeType="clickEffect">
+                                  <p:stCondLst>
+                                    <p:cond delay="0"/>
+                                  </p:stCondLst>
+                                  <p:childTnLst>
+                                    <p:set>
+                                      <p:cBhvr>
+                                        <p:cTn id="22" dur="1" fill="hold">
+                                          <p:stCondLst>
+                                            <p:cond delay="0"/>
+                                          </p:stCondLst>
+                                        </p:cTn>
+                                        <p:tgtEl>
+                                          <p:spTgt spid="4">
+                                            <p:txEl>
+                                              <p:pRg st="2" end="2"/>
+                                            </p:txEl>
+                                          </p:spTgt>
+                                        </p:tgtEl>
+                                        <p:attrNameLst>
+                                          <p:attrName>style.visibility</p:attrName>
+                                        </p:attrNameLst>
+                                      </p:cBhvr>
+                                      <p:to>
+                                        <p:strVal val="visible"/>
+                                      </p:to>
+                                    </p:set>
+                                  </p:childTnLst>
+                                </p:cTn>
+                              </p:par>
+                            </p:childTnLst>
+                          </p:cTn>
+                        </p:par>
+                      </p:childTnLst>
+                    </p:cTn>
+                  </p:par>
+                  <p:par>
+                    <p:cTn id="23" fill="hold">
+                      <p:stCondLst>
+                        <p:cond delay="indefinite"/>
+                      </p:stCondLst>
+                      <p:childTnLst>
+                        <p:par>
+                          <p:cTn id="24" fill="hold">
+                            <p:stCondLst>
+                              <p:cond delay="0"/>
+                            </p:stCondLst>
+                            <p:childTnLst>
+                              <p:par>
+                                <p:cTn id="25" presetID="1" presetClass="entr" presetSubtype="0" fill="hold" grpId="0" nodeType="clickEffect">
+                                  <p:stCondLst>
+                                    <p:cond delay="0"/>
+                                  </p:stCondLst>
+                                  <p:childTnLst>
+                                    <p:set>
+                                      <p:cBhvr>
+                                        <p:cTn id="26" dur="1" fill="hold">
+                                          <p:stCondLst>
+                                            <p:cond delay="0"/>
+                                          </p:stCondLst>
+                                        </p:cTn>
+                                        <p:tgtEl>
+                                          <p:spTgt spid="4">
+                                            <p:txEl>
+                                              <p:pRg st="3" end="3"/>
+                                            </p:txEl>
+                                          </p:spTgt>
+                                        </p:tgtEl>
+                                        <p:attrNameLst>
+                                          <p:attrName>style.visibility</p:attrName>
+                                        </p:attrNameLst>
+                                      </p:cBhvr>
+                                      <p:to>
+                                        <p:strVal val="visible"/>
+                                      </p:to>
+                                    </p:set>
+                                  </p:childTnLst>
+                                </p:cTn>
+                              </p:par>
+                            </p:childTnLst>
+                          </p:cTn>
+                        </p:par>
+                      </p:childTnLst>
+                    </p:cTn>
+                  </p:par>
+                </p:childTnLst>
+              </p:cTn>
+              <p:prevCondLst>
+                <p:cond evt="onPrev" delay="0">
+                  <p:tgtEl>
+                    <p:sldTgt/>
+                  </p:tgtEl>
+                </p:cond>
+              </p:prevCondLst>
+              <p:nextCondLst>
+                <p:cond evt="onNext" delay="0">
+                  <p:tgtEl>
+                    <p:sldTgt/>
+                  </p:tgtEl>
+                </p:cond>
+              </p:nextCondLst>
+            </p:seq>
+          </p:childTnLst>
+        </p:cTn>
       </p:par>
     </p:tnLst>
+    <p:bldLst>
+      <p:bldP spid="4" grpId="0" build="p"/>
+      <p:bldP spid="9" grpId="0"/>
+    </p:bldLst>
   </p:timing>
 </p:sld>
 </file>
@@ -6079,9 +7939,329 @@
   <p:timing>
     <p:tnLst>
       <p:par>
-        <p:cTn id="1" dur="indefinite" restart="never" nodeType="tmRoot"/>
+        <p:cTn id="1" dur="indefinite" restart="never" nodeType="tmRoot">
+          <p:childTnLst>
+            <p:seq concurrent="1" nextAc="seek">
+              <p:cTn id="2" dur="indefinite" nodeType="mainSeq">
+                <p:childTnLst>
+                  <p:par>
+                    <p:cTn id="3" fill="hold">
+                      <p:stCondLst>
+                        <p:cond delay="indefinite"/>
+                      </p:stCondLst>
+                      <p:childTnLst>
+                        <p:par>
+                          <p:cTn id="4" fill="hold">
+                            <p:stCondLst>
+                              <p:cond delay="0"/>
+                            </p:stCondLst>
+                            <p:childTnLst>
+                              <p:par>
+                                <p:cTn id="5" presetID="1" presetClass="entr" presetSubtype="0" fill="hold" grpId="0" nodeType="clickEffect">
+                                  <p:stCondLst>
+                                    <p:cond delay="0"/>
+                                  </p:stCondLst>
+                                  <p:childTnLst>
+                                    <p:set>
+                                      <p:cBhvr>
+                                        <p:cTn id="6" dur="1" fill="hold">
+                                          <p:stCondLst>
+                                            <p:cond delay="0"/>
+                                          </p:stCondLst>
+                                        </p:cTn>
+                                        <p:tgtEl>
+                                          <p:spTgt spid="8">
+                                            <p:txEl>
+                                              <p:pRg st="0" end="0"/>
+                                            </p:txEl>
+                                          </p:spTgt>
+                                        </p:tgtEl>
+                                        <p:attrNameLst>
+                                          <p:attrName>style.visibility</p:attrName>
+                                        </p:attrNameLst>
+                                      </p:cBhvr>
+                                      <p:to>
+                                        <p:strVal val="visible"/>
+                                      </p:to>
+                                    </p:set>
+                                  </p:childTnLst>
+                                </p:cTn>
+                              </p:par>
+                            </p:childTnLst>
+                          </p:cTn>
+                        </p:par>
+                      </p:childTnLst>
+                    </p:cTn>
+                  </p:par>
+                  <p:par>
+                    <p:cTn id="7" fill="hold">
+                      <p:stCondLst>
+                        <p:cond delay="indefinite"/>
+                      </p:stCondLst>
+                      <p:childTnLst>
+                        <p:par>
+                          <p:cTn id="8" fill="hold">
+                            <p:stCondLst>
+                              <p:cond delay="0"/>
+                            </p:stCondLst>
+                            <p:childTnLst>
+                              <p:par>
+                                <p:cTn id="9" presetID="1" presetClass="entr" presetSubtype="0" fill="hold" grpId="0" nodeType="clickEffect">
+                                  <p:stCondLst>
+                                    <p:cond delay="0"/>
+                                  </p:stCondLst>
+                                  <p:childTnLst>
+                                    <p:set>
+                                      <p:cBhvr>
+                                        <p:cTn id="10" dur="1" fill="hold">
+                                          <p:stCondLst>
+                                            <p:cond delay="0"/>
+                                          </p:stCondLst>
+                                        </p:cTn>
+                                        <p:tgtEl>
+                                          <p:spTgt spid="8">
+                                            <p:txEl>
+                                              <p:pRg st="1" end="1"/>
+                                            </p:txEl>
+                                          </p:spTgt>
+                                        </p:tgtEl>
+                                        <p:attrNameLst>
+                                          <p:attrName>style.visibility</p:attrName>
+                                        </p:attrNameLst>
+                                      </p:cBhvr>
+                                      <p:to>
+                                        <p:strVal val="visible"/>
+                                      </p:to>
+                                    </p:set>
+                                  </p:childTnLst>
+                                </p:cTn>
+                              </p:par>
+                            </p:childTnLst>
+                          </p:cTn>
+                        </p:par>
+                      </p:childTnLst>
+                    </p:cTn>
+                  </p:par>
+                  <p:par>
+                    <p:cTn id="11" fill="hold">
+                      <p:stCondLst>
+                        <p:cond delay="indefinite"/>
+                      </p:stCondLst>
+                      <p:childTnLst>
+                        <p:par>
+                          <p:cTn id="12" fill="hold">
+                            <p:stCondLst>
+                              <p:cond delay="0"/>
+                            </p:stCondLst>
+                            <p:childTnLst>
+                              <p:par>
+                                <p:cTn id="13" presetID="1" presetClass="entr" presetSubtype="0" fill="hold" grpId="0" nodeType="clickEffect">
+                                  <p:stCondLst>
+                                    <p:cond delay="0"/>
+                                  </p:stCondLst>
+                                  <p:childTnLst>
+                                    <p:set>
+                                      <p:cBhvr>
+                                        <p:cTn id="14" dur="1" fill="hold">
+                                          <p:stCondLst>
+                                            <p:cond delay="0"/>
+                                          </p:stCondLst>
+                                        </p:cTn>
+                                        <p:tgtEl>
+                                          <p:spTgt spid="8">
+                                            <p:txEl>
+                                              <p:pRg st="2" end="2"/>
+                                            </p:txEl>
+                                          </p:spTgt>
+                                        </p:tgtEl>
+                                        <p:attrNameLst>
+                                          <p:attrName>style.visibility</p:attrName>
+                                        </p:attrNameLst>
+                                      </p:cBhvr>
+                                      <p:to>
+                                        <p:strVal val="visible"/>
+                                      </p:to>
+                                    </p:set>
+                                  </p:childTnLst>
+                                </p:cTn>
+                              </p:par>
+                            </p:childTnLst>
+                          </p:cTn>
+                        </p:par>
+                      </p:childTnLst>
+                    </p:cTn>
+                  </p:par>
+                  <p:par>
+                    <p:cTn id="15" fill="hold">
+                      <p:stCondLst>
+                        <p:cond delay="indefinite"/>
+                      </p:stCondLst>
+                      <p:childTnLst>
+                        <p:par>
+                          <p:cTn id="16" fill="hold">
+                            <p:stCondLst>
+                              <p:cond delay="0"/>
+                            </p:stCondLst>
+                            <p:childTnLst>
+                              <p:par>
+                                <p:cTn id="17" presetID="1" presetClass="entr" presetSubtype="0" fill="hold" grpId="0" nodeType="clickEffect">
+                                  <p:stCondLst>
+                                    <p:cond delay="0"/>
+                                  </p:stCondLst>
+                                  <p:childTnLst>
+                                    <p:set>
+                                      <p:cBhvr>
+                                        <p:cTn id="18" dur="1" fill="hold">
+                                          <p:stCondLst>
+                                            <p:cond delay="0"/>
+                                          </p:stCondLst>
+                                        </p:cTn>
+                                        <p:tgtEl>
+                                          <p:spTgt spid="8">
+                                            <p:txEl>
+                                              <p:pRg st="3" end="3"/>
+                                            </p:txEl>
+                                          </p:spTgt>
+                                        </p:tgtEl>
+                                        <p:attrNameLst>
+                                          <p:attrName>style.visibility</p:attrName>
+                                        </p:attrNameLst>
+                                      </p:cBhvr>
+                                      <p:to>
+                                        <p:strVal val="visible"/>
+                                      </p:to>
+                                    </p:set>
+                                  </p:childTnLst>
+                                </p:cTn>
+                              </p:par>
+                            </p:childTnLst>
+                          </p:cTn>
+                        </p:par>
+                      </p:childTnLst>
+                    </p:cTn>
+                  </p:par>
+                  <p:par>
+                    <p:cTn id="19" fill="hold">
+                      <p:stCondLst>
+                        <p:cond delay="indefinite"/>
+                      </p:stCondLst>
+                      <p:childTnLst>
+                        <p:par>
+                          <p:cTn id="20" fill="hold">
+                            <p:stCondLst>
+                              <p:cond delay="0"/>
+                            </p:stCondLst>
+                            <p:childTnLst>
+                              <p:par>
+                                <p:cTn id="21" presetID="1" presetClass="entr" presetSubtype="0" fill="hold" grpId="0" nodeType="clickEffect">
+                                  <p:stCondLst>
+                                    <p:cond delay="0"/>
+                                  </p:stCondLst>
+                                  <p:childTnLst>
+                                    <p:set>
+                                      <p:cBhvr>
+                                        <p:cTn id="22" dur="1" fill="hold">
+                                          <p:stCondLst>
+                                            <p:cond delay="0"/>
+                                          </p:stCondLst>
+                                        </p:cTn>
+                                        <p:tgtEl>
+                                          <p:spTgt spid="8">
+                                            <p:txEl>
+                                              <p:pRg st="4" end="4"/>
+                                            </p:txEl>
+                                          </p:spTgt>
+                                        </p:tgtEl>
+                                        <p:attrNameLst>
+                                          <p:attrName>style.visibility</p:attrName>
+                                        </p:attrNameLst>
+                                      </p:cBhvr>
+                                      <p:to>
+                                        <p:strVal val="visible"/>
+                                      </p:to>
+                                    </p:set>
+                                  </p:childTnLst>
+                                </p:cTn>
+                              </p:par>
+                            </p:childTnLst>
+                          </p:cTn>
+                        </p:par>
+                      </p:childTnLst>
+                    </p:cTn>
+                  </p:par>
+                  <p:par>
+                    <p:cTn id="23" fill="hold">
+                      <p:stCondLst>
+                        <p:cond delay="indefinite"/>
+                      </p:stCondLst>
+                      <p:childTnLst>
+                        <p:par>
+                          <p:cTn id="24" fill="hold">
+                            <p:stCondLst>
+                              <p:cond delay="0"/>
+                            </p:stCondLst>
+                            <p:childTnLst>
+                              <p:par>
+                                <p:cTn id="25" presetID="1" presetClass="entr" presetSubtype="0" fill="hold" grpId="0" nodeType="clickEffect">
+                                  <p:stCondLst>
+                                    <p:cond delay="0"/>
+                                  </p:stCondLst>
+                                  <p:childTnLst>
+                                    <p:set>
+                                      <p:cBhvr>
+                                        <p:cTn id="26" dur="1" fill="hold">
+                                          <p:stCondLst>
+                                            <p:cond delay="0"/>
+                                          </p:stCondLst>
+                                        </p:cTn>
+                                        <p:tgtEl>
+                                          <p:spTgt spid="8">
+                                            <p:txEl>
+                                              <p:pRg st="5" end="5"/>
+                                            </p:txEl>
+                                          </p:spTgt>
+                                        </p:tgtEl>
+                                        <p:attrNameLst>
+                                          <p:attrName>style.visibility</p:attrName>
+                                        </p:attrNameLst>
+                                      </p:cBhvr>
+                                      <p:to>
+                                        <p:strVal val="visible"/>
+                                      </p:to>
+                                    </p:set>
+                                  </p:childTnLst>
+                                </p:cTn>
+                              </p:par>
+                            </p:childTnLst>
+                          </p:cTn>
+                        </p:par>
+                      </p:childTnLst>
+                    </p:cTn>
+                  </p:par>
+                </p:childTnLst>
+              </p:cTn>
+              <p:prevCondLst>
+                <p:cond evt="onPrev" delay="0">
+                  <p:tgtEl>
+                    <p:sldTgt/>
+                  </p:tgtEl>
+                </p:cond>
+              </p:prevCondLst>
+              <p:nextCondLst>
+                <p:cond evt="onNext" delay="0">
+                  <p:tgtEl>
+                    <p:sldTgt/>
+                  </p:tgtEl>
+                </p:cond>
+              </p:nextCondLst>
+            </p:seq>
+          </p:childTnLst>
+        </p:cTn>
       </p:par>
     </p:tnLst>
+    <p:bldLst>
+      <p:bldP spid="8" grpId="0" build="p"/>
+    </p:bldLst>
   </p:timing>
 </p:sld>
 </file>
@@ -6254,9 +8434,280 @@
   <p:timing>
     <p:tnLst>
       <p:par>
-        <p:cTn id="1" dur="indefinite" restart="never" nodeType="tmRoot"/>
+        <p:cTn id="1" dur="indefinite" restart="never" nodeType="tmRoot">
+          <p:childTnLst>
+            <p:seq concurrent="1" nextAc="seek">
+              <p:cTn id="2" dur="indefinite" nodeType="mainSeq">
+                <p:childTnLst>
+                  <p:par>
+                    <p:cTn id="3" fill="hold">
+                      <p:stCondLst>
+                        <p:cond delay="indefinite"/>
+                      </p:stCondLst>
+                      <p:childTnLst>
+                        <p:par>
+                          <p:cTn id="4" fill="hold">
+                            <p:stCondLst>
+                              <p:cond delay="0"/>
+                            </p:stCondLst>
+                            <p:childTnLst>
+                              <p:par>
+                                <p:cTn id="5" presetID="1" presetClass="entr" presetSubtype="0" fill="hold" grpId="0" nodeType="clickEffect">
+                                  <p:stCondLst>
+                                    <p:cond delay="0"/>
+                                  </p:stCondLst>
+                                  <p:childTnLst>
+                                    <p:set>
+                                      <p:cBhvr>
+                                        <p:cTn id="6" dur="1" fill="hold">
+                                          <p:stCondLst>
+                                            <p:cond delay="0"/>
+                                          </p:stCondLst>
+                                        </p:cTn>
+                                        <p:tgtEl>
+                                          <p:spTgt spid="3">
+                                            <p:txEl>
+                                              <p:pRg st="0" end="0"/>
+                                            </p:txEl>
+                                          </p:spTgt>
+                                        </p:tgtEl>
+                                        <p:attrNameLst>
+                                          <p:attrName>style.visibility</p:attrName>
+                                        </p:attrNameLst>
+                                      </p:cBhvr>
+                                      <p:to>
+                                        <p:strVal val="visible"/>
+                                      </p:to>
+                                    </p:set>
+                                  </p:childTnLst>
+                                </p:cTn>
+                              </p:par>
+                            </p:childTnLst>
+                          </p:cTn>
+                        </p:par>
+                      </p:childTnLst>
+                    </p:cTn>
+                  </p:par>
+                  <p:par>
+                    <p:cTn id="7" fill="hold">
+                      <p:stCondLst>
+                        <p:cond delay="indefinite"/>
+                      </p:stCondLst>
+                      <p:childTnLst>
+                        <p:par>
+                          <p:cTn id="8" fill="hold">
+                            <p:stCondLst>
+                              <p:cond delay="0"/>
+                            </p:stCondLst>
+                            <p:childTnLst>
+                              <p:par>
+                                <p:cTn id="9" presetID="1" presetClass="entr" presetSubtype="0" fill="hold" grpId="0" nodeType="clickEffect">
+                                  <p:stCondLst>
+                                    <p:cond delay="0"/>
+                                  </p:stCondLst>
+                                  <p:childTnLst>
+                                    <p:set>
+                                      <p:cBhvr>
+                                        <p:cTn id="10" dur="1" fill="hold">
+                                          <p:stCondLst>
+                                            <p:cond delay="0"/>
+                                          </p:stCondLst>
+                                        </p:cTn>
+                                        <p:tgtEl>
+                                          <p:spTgt spid="3">
+                                            <p:txEl>
+                                              <p:pRg st="1" end="1"/>
+                                            </p:txEl>
+                                          </p:spTgt>
+                                        </p:tgtEl>
+                                        <p:attrNameLst>
+                                          <p:attrName>style.visibility</p:attrName>
+                                        </p:attrNameLst>
+                                      </p:cBhvr>
+                                      <p:to>
+                                        <p:strVal val="visible"/>
+                                      </p:to>
+                                    </p:set>
+                                  </p:childTnLst>
+                                </p:cTn>
+                              </p:par>
+                            </p:childTnLst>
+                          </p:cTn>
+                        </p:par>
+                      </p:childTnLst>
+                    </p:cTn>
+                  </p:par>
+                  <p:par>
+                    <p:cTn id="11" fill="hold">
+                      <p:stCondLst>
+                        <p:cond delay="indefinite"/>
+                      </p:stCondLst>
+                      <p:childTnLst>
+                        <p:par>
+                          <p:cTn id="12" fill="hold">
+                            <p:stCondLst>
+                              <p:cond delay="0"/>
+                            </p:stCondLst>
+                            <p:childTnLst>
+                              <p:par>
+                                <p:cTn id="13" presetID="1" presetClass="entr" presetSubtype="0" fill="hold" grpId="0" nodeType="clickEffect">
+                                  <p:stCondLst>
+                                    <p:cond delay="0"/>
+                                  </p:stCondLst>
+                                  <p:childTnLst>
+                                    <p:set>
+                                      <p:cBhvr>
+                                        <p:cTn id="14" dur="1" fill="hold">
+                                          <p:stCondLst>
+                                            <p:cond delay="0"/>
+                                          </p:stCondLst>
+                                        </p:cTn>
+                                        <p:tgtEl>
+                                          <p:spTgt spid="3">
+                                            <p:txEl>
+                                              <p:pRg st="2" end="2"/>
+                                            </p:txEl>
+                                          </p:spTgt>
+                                        </p:tgtEl>
+                                        <p:attrNameLst>
+                                          <p:attrName>style.visibility</p:attrName>
+                                        </p:attrNameLst>
+                                      </p:cBhvr>
+                                      <p:to>
+                                        <p:strVal val="visible"/>
+                                      </p:to>
+                                    </p:set>
+                                  </p:childTnLst>
+                                </p:cTn>
+                              </p:par>
+                            </p:childTnLst>
+                          </p:cTn>
+                        </p:par>
+                      </p:childTnLst>
+                    </p:cTn>
+                  </p:par>
+                  <p:par>
+                    <p:cTn id="15" fill="hold">
+                      <p:stCondLst>
+                        <p:cond delay="indefinite"/>
+                      </p:stCondLst>
+                      <p:childTnLst>
+                        <p:par>
+                          <p:cTn id="16" fill="hold">
+                            <p:stCondLst>
+                              <p:cond delay="0"/>
+                            </p:stCondLst>
+                            <p:childTnLst>
+                              <p:par>
+                                <p:cTn id="17" presetID="1" presetClass="entr" presetSubtype="0" fill="hold" grpId="0" nodeType="clickEffect">
+                                  <p:stCondLst>
+                                    <p:cond delay="0"/>
+                                  </p:stCondLst>
+                                  <p:childTnLst>
+                                    <p:set>
+                                      <p:cBhvr>
+                                        <p:cTn id="18" dur="1" fill="hold">
+                                          <p:stCondLst>
+                                            <p:cond delay="0"/>
+                                          </p:stCondLst>
+                                        </p:cTn>
+                                        <p:tgtEl>
+                                          <p:spTgt spid="3">
+                                            <p:txEl>
+                                              <p:pRg st="3" end="3"/>
+                                            </p:txEl>
+                                          </p:spTgt>
+                                        </p:tgtEl>
+                                        <p:attrNameLst>
+                                          <p:attrName>style.visibility</p:attrName>
+                                        </p:attrNameLst>
+                                      </p:cBhvr>
+                                      <p:to>
+                                        <p:strVal val="visible"/>
+                                      </p:to>
+                                    </p:set>
+                                  </p:childTnLst>
+                                </p:cTn>
+                              </p:par>
+                            </p:childTnLst>
+                          </p:cTn>
+                        </p:par>
+                      </p:childTnLst>
+                    </p:cTn>
+                  </p:par>
+                  <p:par>
+                    <p:cTn id="19" fill="hold">
+                      <p:stCondLst>
+                        <p:cond delay="indefinite"/>
+                      </p:stCondLst>
+                      <p:childTnLst>
+                        <p:par>
+                          <p:cTn id="20" fill="hold">
+                            <p:stCondLst>
+                              <p:cond delay="0"/>
+                            </p:stCondLst>
+                            <p:childTnLst>
+                              <p:par>
+                                <p:cTn id="21" presetID="1" presetClass="entr" presetSubtype="0" fill="hold" grpId="0" nodeType="clickEffect">
+                                  <p:stCondLst>
+                                    <p:cond delay="0"/>
+                                  </p:stCondLst>
+                                  <p:childTnLst>
+                                    <p:set>
+                                      <p:cBhvr>
+                                        <p:cTn id="22" dur="1" fill="hold">
+                                          <p:stCondLst>
+                                            <p:cond delay="0"/>
+                                          </p:stCondLst>
+                                        </p:cTn>
+                                        <p:tgtEl>
+                                          <p:spTgt spid="3">
+                                            <p:txEl>
+                                              <p:pRg st="4" end="4"/>
+                                            </p:txEl>
+                                          </p:spTgt>
+                                        </p:tgtEl>
+                                        <p:attrNameLst>
+                                          <p:attrName>style.visibility</p:attrName>
+                                        </p:attrNameLst>
+                                      </p:cBhvr>
+                                      <p:to>
+                                        <p:strVal val="visible"/>
+                                      </p:to>
+                                    </p:set>
+                                  </p:childTnLst>
+                                </p:cTn>
+                              </p:par>
+                            </p:childTnLst>
+                          </p:cTn>
+                        </p:par>
+                      </p:childTnLst>
+                    </p:cTn>
+                  </p:par>
+                </p:childTnLst>
+              </p:cTn>
+              <p:prevCondLst>
+                <p:cond evt="onPrev" delay="0">
+                  <p:tgtEl>
+                    <p:sldTgt/>
+                  </p:tgtEl>
+                </p:cond>
+              </p:prevCondLst>
+              <p:nextCondLst>
+                <p:cond evt="onNext" delay="0">
+                  <p:tgtEl>
+                    <p:sldTgt/>
+                  </p:tgtEl>
+                </p:cond>
+              </p:nextCondLst>
+            </p:seq>
+          </p:childTnLst>
+        </p:cTn>
       </p:par>
     </p:tnLst>
+    <p:bldLst>
+      <p:bldP spid="3" grpId="0" build="p"/>
+    </p:bldLst>
   </p:timing>
 </p:sld>
 </file>
@@ -6572,9 +9023,280 @@
   <p:timing>
     <p:tnLst>
       <p:par>
-        <p:cTn id="1" dur="indefinite" restart="never" nodeType="tmRoot"/>
+        <p:cTn id="1" dur="indefinite" restart="never" nodeType="tmRoot">
+          <p:childTnLst>
+            <p:seq concurrent="1" nextAc="seek">
+              <p:cTn id="2" dur="indefinite" nodeType="mainSeq">
+                <p:childTnLst>
+                  <p:par>
+                    <p:cTn id="3" fill="hold">
+                      <p:stCondLst>
+                        <p:cond delay="indefinite"/>
+                      </p:stCondLst>
+                      <p:childTnLst>
+                        <p:par>
+                          <p:cTn id="4" fill="hold">
+                            <p:stCondLst>
+                              <p:cond delay="0"/>
+                            </p:stCondLst>
+                            <p:childTnLst>
+                              <p:par>
+                                <p:cTn id="5" presetID="1" presetClass="entr" presetSubtype="0" fill="hold" grpId="0" nodeType="clickEffect">
+                                  <p:stCondLst>
+                                    <p:cond delay="0"/>
+                                  </p:stCondLst>
+                                  <p:childTnLst>
+                                    <p:set>
+                                      <p:cBhvr>
+                                        <p:cTn id="6" dur="1" fill="hold">
+                                          <p:stCondLst>
+                                            <p:cond delay="0"/>
+                                          </p:stCondLst>
+                                        </p:cTn>
+                                        <p:tgtEl>
+                                          <p:spTgt spid="8">
+                                            <p:txEl>
+                                              <p:pRg st="0" end="0"/>
+                                            </p:txEl>
+                                          </p:spTgt>
+                                        </p:tgtEl>
+                                        <p:attrNameLst>
+                                          <p:attrName>style.visibility</p:attrName>
+                                        </p:attrNameLst>
+                                      </p:cBhvr>
+                                      <p:to>
+                                        <p:strVal val="visible"/>
+                                      </p:to>
+                                    </p:set>
+                                  </p:childTnLst>
+                                </p:cTn>
+                              </p:par>
+                            </p:childTnLst>
+                          </p:cTn>
+                        </p:par>
+                      </p:childTnLst>
+                    </p:cTn>
+                  </p:par>
+                  <p:par>
+                    <p:cTn id="7" fill="hold">
+                      <p:stCondLst>
+                        <p:cond delay="indefinite"/>
+                      </p:stCondLst>
+                      <p:childTnLst>
+                        <p:par>
+                          <p:cTn id="8" fill="hold">
+                            <p:stCondLst>
+                              <p:cond delay="0"/>
+                            </p:stCondLst>
+                            <p:childTnLst>
+                              <p:par>
+                                <p:cTn id="9" presetID="1" presetClass="entr" presetSubtype="0" fill="hold" grpId="0" nodeType="clickEffect">
+                                  <p:stCondLst>
+                                    <p:cond delay="0"/>
+                                  </p:stCondLst>
+                                  <p:childTnLst>
+                                    <p:set>
+                                      <p:cBhvr>
+                                        <p:cTn id="10" dur="1" fill="hold">
+                                          <p:stCondLst>
+                                            <p:cond delay="0"/>
+                                          </p:stCondLst>
+                                        </p:cTn>
+                                        <p:tgtEl>
+                                          <p:spTgt spid="8">
+                                            <p:txEl>
+                                              <p:pRg st="1" end="1"/>
+                                            </p:txEl>
+                                          </p:spTgt>
+                                        </p:tgtEl>
+                                        <p:attrNameLst>
+                                          <p:attrName>style.visibility</p:attrName>
+                                        </p:attrNameLst>
+                                      </p:cBhvr>
+                                      <p:to>
+                                        <p:strVal val="visible"/>
+                                      </p:to>
+                                    </p:set>
+                                  </p:childTnLst>
+                                </p:cTn>
+                              </p:par>
+                            </p:childTnLst>
+                          </p:cTn>
+                        </p:par>
+                      </p:childTnLst>
+                    </p:cTn>
+                  </p:par>
+                  <p:par>
+                    <p:cTn id="11" fill="hold">
+                      <p:stCondLst>
+                        <p:cond delay="indefinite"/>
+                      </p:stCondLst>
+                      <p:childTnLst>
+                        <p:par>
+                          <p:cTn id="12" fill="hold">
+                            <p:stCondLst>
+                              <p:cond delay="0"/>
+                            </p:stCondLst>
+                            <p:childTnLst>
+                              <p:par>
+                                <p:cTn id="13" presetID="1" presetClass="entr" presetSubtype="0" fill="hold" grpId="0" nodeType="clickEffect">
+                                  <p:stCondLst>
+                                    <p:cond delay="0"/>
+                                  </p:stCondLst>
+                                  <p:childTnLst>
+                                    <p:set>
+                                      <p:cBhvr>
+                                        <p:cTn id="14" dur="1" fill="hold">
+                                          <p:stCondLst>
+                                            <p:cond delay="0"/>
+                                          </p:stCondLst>
+                                        </p:cTn>
+                                        <p:tgtEl>
+                                          <p:spTgt spid="8">
+                                            <p:txEl>
+                                              <p:pRg st="2" end="2"/>
+                                            </p:txEl>
+                                          </p:spTgt>
+                                        </p:tgtEl>
+                                        <p:attrNameLst>
+                                          <p:attrName>style.visibility</p:attrName>
+                                        </p:attrNameLst>
+                                      </p:cBhvr>
+                                      <p:to>
+                                        <p:strVal val="visible"/>
+                                      </p:to>
+                                    </p:set>
+                                  </p:childTnLst>
+                                </p:cTn>
+                              </p:par>
+                            </p:childTnLst>
+                          </p:cTn>
+                        </p:par>
+                      </p:childTnLst>
+                    </p:cTn>
+                  </p:par>
+                  <p:par>
+                    <p:cTn id="15" fill="hold">
+                      <p:stCondLst>
+                        <p:cond delay="indefinite"/>
+                      </p:stCondLst>
+                      <p:childTnLst>
+                        <p:par>
+                          <p:cTn id="16" fill="hold">
+                            <p:stCondLst>
+                              <p:cond delay="0"/>
+                            </p:stCondLst>
+                            <p:childTnLst>
+                              <p:par>
+                                <p:cTn id="17" presetID="1" presetClass="entr" presetSubtype="0" fill="hold" grpId="0" nodeType="clickEffect">
+                                  <p:stCondLst>
+                                    <p:cond delay="0"/>
+                                  </p:stCondLst>
+                                  <p:childTnLst>
+                                    <p:set>
+                                      <p:cBhvr>
+                                        <p:cTn id="18" dur="1" fill="hold">
+                                          <p:stCondLst>
+                                            <p:cond delay="0"/>
+                                          </p:stCondLst>
+                                        </p:cTn>
+                                        <p:tgtEl>
+                                          <p:spTgt spid="8">
+                                            <p:txEl>
+                                              <p:pRg st="3" end="3"/>
+                                            </p:txEl>
+                                          </p:spTgt>
+                                        </p:tgtEl>
+                                        <p:attrNameLst>
+                                          <p:attrName>style.visibility</p:attrName>
+                                        </p:attrNameLst>
+                                      </p:cBhvr>
+                                      <p:to>
+                                        <p:strVal val="visible"/>
+                                      </p:to>
+                                    </p:set>
+                                  </p:childTnLst>
+                                </p:cTn>
+                              </p:par>
+                            </p:childTnLst>
+                          </p:cTn>
+                        </p:par>
+                      </p:childTnLst>
+                    </p:cTn>
+                  </p:par>
+                  <p:par>
+                    <p:cTn id="19" fill="hold">
+                      <p:stCondLst>
+                        <p:cond delay="indefinite"/>
+                      </p:stCondLst>
+                      <p:childTnLst>
+                        <p:par>
+                          <p:cTn id="20" fill="hold">
+                            <p:stCondLst>
+                              <p:cond delay="0"/>
+                            </p:stCondLst>
+                            <p:childTnLst>
+                              <p:par>
+                                <p:cTn id="21" presetID="1" presetClass="entr" presetSubtype="0" fill="hold" grpId="0" nodeType="clickEffect">
+                                  <p:stCondLst>
+                                    <p:cond delay="0"/>
+                                  </p:stCondLst>
+                                  <p:childTnLst>
+                                    <p:set>
+                                      <p:cBhvr>
+                                        <p:cTn id="22" dur="1" fill="hold">
+                                          <p:stCondLst>
+                                            <p:cond delay="0"/>
+                                          </p:stCondLst>
+                                        </p:cTn>
+                                        <p:tgtEl>
+                                          <p:spTgt spid="8">
+                                            <p:txEl>
+                                              <p:pRg st="4" end="4"/>
+                                            </p:txEl>
+                                          </p:spTgt>
+                                        </p:tgtEl>
+                                        <p:attrNameLst>
+                                          <p:attrName>style.visibility</p:attrName>
+                                        </p:attrNameLst>
+                                      </p:cBhvr>
+                                      <p:to>
+                                        <p:strVal val="visible"/>
+                                      </p:to>
+                                    </p:set>
+                                  </p:childTnLst>
+                                </p:cTn>
+                              </p:par>
+                            </p:childTnLst>
+                          </p:cTn>
+                        </p:par>
+                      </p:childTnLst>
+                    </p:cTn>
+                  </p:par>
+                </p:childTnLst>
+              </p:cTn>
+              <p:prevCondLst>
+                <p:cond evt="onPrev" delay="0">
+                  <p:tgtEl>
+                    <p:sldTgt/>
+                  </p:tgtEl>
+                </p:cond>
+              </p:prevCondLst>
+              <p:nextCondLst>
+                <p:cond evt="onNext" delay="0">
+                  <p:tgtEl>
+                    <p:sldTgt/>
+                  </p:tgtEl>
+                </p:cond>
+              </p:nextCondLst>
+            </p:seq>
+          </p:childTnLst>
+        </p:cTn>
       </p:par>
     </p:tnLst>
+    <p:bldLst>
+      <p:bldP spid="8" grpId="0" build="p"/>
+    </p:bldLst>
   </p:timing>
 </p:sld>
 </file>
@@ -6913,9 +9635,178 @@
   <p:timing>
     <p:tnLst>
       <p:par>
-        <p:cTn id="1" dur="indefinite" restart="never" nodeType="tmRoot"/>
+        <p:cTn id="1" dur="indefinite" restart="never" nodeType="tmRoot">
+          <p:childTnLst>
+            <p:seq concurrent="1" nextAc="seek">
+              <p:cTn id="2" dur="indefinite" nodeType="mainSeq">
+                <p:childTnLst>
+                  <p:par>
+                    <p:cTn id="3" fill="hold">
+                      <p:stCondLst>
+                        <p:cond delay="indefinite"/>
+                      </p:stCondLst>
+                      <p:childTnLst>
+                        <p:par>
+                          <p:cTn id="4" fill="hold">
+                            <p:stCondLst>
+                              <p:cond delay="0"/>
+                            </p:stCondLst>
+                            <p:childTnLst>
+                              <p:par>
+                                <p:cTn id="5" presetID="1" presetClass="entr" presetSubtype="0" fill="hold" grpId="0" nodeType="clickEffect">
+                                  <p:stCondLst>
+                                    <p:cond delay="0"/>
+                                  </p:stCondLst>
+                                  <p:childTnLst>
+                                    <p:set>
+                                      <p:cBhvr>
+                                        <p:cTn id="6" dur="1" fill="hold">
+                                          <p:stCondLst>
+                                            <p:cond delay="0"/>
+                                          </p:stCondLst>
+                                        </p:cTn>
+                                        <p:tgtEl>
+                                          <p:spTgt spid="8">
+                                            <p:txEl>
+                                              <p:pRg st="3" end="3"/>
+                                            </p:txEl>
+                                          </p:spTgt>
+                                        </p:tgtEl>
+                                        <p:attrNameLst>
+                                          <p:attrName>style.visibility</p:attrName>
+                                        </p:attrNameLst>
+                                      </p:cBhvr>
+                                      <p:to>
+                                        <p:strVal val="visible"/>
+                                      </p:to>
+                                    </p:set>
+                                  </p:childTnLst>
+                                </p:cTn>
+                              </p:par>
+                            </p:childTnLst>
+                          </p:cTn>
+                        </p:par>
+                      </p:childTnLst>
+                    </p:cTn>
+                  </p:par>
+                  <p:par>
+                    <p:cTn id="7" fill="hold">
+                      <p:stCondLst>
+                        <p:cond delay="indefinite"/>
+                      </p:stCondLst>
+                      <p:childTnLst>
+                        <p:par>
+                          <p:cTn id="8" fill="hold">
+                            <p:stCondLst>
+                              <p:cond delay="0"/>
+                            </p:stCondLst>
+                            <p:childTnLst>
+                              <p:par>
+                                <p:cTn id="9" presetID="1" presetClass="entr" presetSubtype="0" fill="hold" grpId="0" nodeType="clickEffect">
+                                  <p:stCondLst>
+                                    <p:cond delay="0"/>
+                                  </p:stCondLst>
+                                  <p:childTnLst>
+                                    <p:set>
+                                      <p:cBhvr>
+                                        <p:cTn id="10" dur="1" fill="hold">
+                                          <p:stCondLst>
+                                            <p:cond delay="0"/>
+                                          </p:stCondLst>
+                                        </p:cTn>
+                                        <p:tgtEl>
+                                          <p:spTgt spid="8">
+                                            <p:txEl>
+                                              <p:pRg st="4" end="4"/>
+                                            </p:txEl>
+                                          </p:spTgt>
+                                        </p:tgtEl>
+                                        <p:attrNameLst>
+                                          <p:attrName>style.visibility</p:attrName>
+                                        </p:attrNameLst>
+                                      </p:cBhvr>
+                                      <p:to>
+                                        <p:strVal val="visible"/>
+                                      </p:to>
+                                    </p:set>
+                                  </p:childTnLst>
+                                </p:cTn>
+                              </p:par>
+                            </p:childTnLst>
+                          </p:cTn>
+                        </p:par>
+                      </p:childTnLst>
+                    </p:cTn>
+                  </p:par>
+                  <p:par>
+                    <p:cTn id="11" fill="hold">
+                      <p:stCondLst>
+                        <p:cond delay="indefinite"/>
+                      </p:stCondLst>
+                      <p:childTnLst>
+                        <p:par>
+                          <p:cTn id="12" fill="hold">
+                            <p:stCondLst>
+                              <p:cond delay="0"/>
+                            </p:stCondLst>
+                            <p:childTnLst>
+                              <p:par>
+                                <p:cTn id="13" presetID="1" presetClass="entr" presetSubtype="0" fill="hold" nodeType="clickEffect">
+                                  <p:stCondLst>
+                                    <p:cond delay="0"/>
+                                  </p:stCondLst>
+                                  <p:childTnLst>
+                                    <p:set>
+                                      <p:cBhvr>
+                                        <p:cTn id="14" dur="1" fill="hold">
+                                          <p:stCondLst>
+                                            <p:cond delay="0"/>
+                                          </p:stCondLst>
+                                        </p:cTn>
+                                        <p:tgtEl>
+                                          <p:spTgt spid="9"/>
+                                        </p:tgtEl>
+                                        <p:attrNameLst>
+                                          <p:attrName>style.visibility</p:attrName>
+                                        </p:attrNameLst>
+                                      </p:cBhvr>
+                                      <p:to>
+                                        <p:strVal val="visible"/>
+                                      </p:to>
+                                    </p:set>
+                                  </p:childTnLst>
+                                </p:cTn>
+                              </p:par>
+                            </p:childTnLst>
+                          </p:cTn>
+                        </p:par>
+                      </p:childTnLst>
+                    </p:cTn>
+                  </p:par>
+                </p:childTnLst>
+              </p:cTn>
+              <p:prevCondLst>
+                <p:cond evt="onPrev" delay="0">
+                  <p:tgtEl>
+                    <p:sldTgt/>
+                  </p:tgtEl>
+                </p:cond>
+              </p:prevCondLst>
+              <p:nextCondLst>
+                <p:cond evt="onNext" delay="0">
+                  <p:tgtEl>
+                    <p:sldTgt/>
+                  </p:tgtEl>
+                </p:cond>
+              </p:nextCondLst>
+            </p:seq>
+          </p:childTnLst>
+        </p:cTn>
       </p:par>
     </p:tnLst>
+    <p:bldLst>
+      <p:bldP spid="8" grpId="0" build="p"/>
+    </p:bldLst>
   </p:timing>
 </p:sld>
 </file>
@@ -7078,9 +9969,182 @@
   <p:timing>
     <p:tnLst>
       <p:par>
-        <p:cTn id="1" dur="indefinite" restart="never" nodeType="tmRoot"/>
+        <p:cTn id="1" dur="indefinite" restart="never" nodeType="tmRoot">
+          <p:childTnLst>
+            <p:seq concurrent="1" nextAc="seek">
+              <p:cTn id="2" dur="indefinite" nodeType="mainSeq">
+                <p:childTnLst>
+                  <p:par>
+                    <p:cTn id="3" fill="hold">
+                      <p:stCondLst>
+                        <p:cond delay="indefinite"/>
+                      </p:stCondLst>
+                      <p:childTnLst>
+                        <p:par>
+                          <p:cTn id="4" fill="hold">
+                            <p:stCondLst>
+                              <p:cond delay="0"/>
+                            </p:stCondLst>
+                            <p:childTnLst>
+                              <p:par>
+                                <p:cTn id="5" presetID="1" presetClass="entr" presetSubtype="0" fill="hold" grpId="0" nodeType="clickEffect">
+                                  <p:stCondLst>
+                                    <p:cond delay="0"/>
+                                  </p:stCondLst>
+                                  <p:childTnLst>
+                                    <p:set>
+                                      <p:cBhvr>
+                                        <p:cTn id="6" dur="1" fill="hold">
+                                          <p:stCondLst>
+                                            <p:cond delay="0"/>
+                                          </p:stCondLst>
+                                        </p:cTn>
+                                        <p:tgtEl>
+                                          <p:spTgt spid="8">
+                                            <p:txEl>
+                                              <p:pRg st="0" end="0"/>
+                                            </p:txEl>
+                                          </p:spTgt>
+                                        </p:tgtEl>
+                                        <p:attrNameLst>
+                                          <p:attrName>style.visibility</p:attrName>
+                                        </p:attrNameLst>
+                                      </p:cBhvr>
+                                      <p:to>
+                                        <p:strVal val="visible"/>
+                                      </p:to>
+                                    </p:set>
+                                  </p:childTnLst>
+                                </p:cTn>
+                              </p:par>
+                            </p:childTnLst>
+                          </p:cTn>
+                        </p:par>
+                      </p:childTnLst>
+                    </p:cTn>
+                  </p:par>
+                  <p:par>
+                    <p:cTn id="7" fill="hold">
+                      <p:stCondLst>
+                        <p:cond delay="indefinite"/>
+                      </p:stCondLst>
+                      <p:childTnLst>
+                        <p:par>
+                          <p:cTn id="8" fill="hold">
+                            <p:stCondLst>
+                              <p:cond delay="0"/>
+                            </p:stCondLst>
+                            <p:childTnLst>
+                              <p:par>
+                                <p:cTn id="9" presetID="1" presetClass="entr" presetSubtype="0" fill="hold" grpId="0" nodeType="clickEffect">
+                                  <p:stCondLst>
+                                    <p:cond delay="0"/>
+                                  </p:stCondLst>
+                                  <p:childTnLst>
+                                    <p:set>
+                                      <p:cBhvr>
+                                        <p:cTn id="10" dur="1" fill="hold">
+                                          <p:stCondLst>
+                                            <p:cond delay="0"/>
+                                          </p:stCondLst>
+                                        </p:cTn>
+                                        <p:tgtEl>
+                                          <p:spTgt spid="8">
+                                            <p:txEl>
+                                              <p:pRg st="1" end="1"/>
+                                            </p:txEl>
+                                          </p:spTgt>
+                                        </p:tgtEl>
+                                        <p:attrNameLst>
+                                          <p:attrName>style.visibility</p:attrName>
+                                        </p:attrNameLst>
+                                      </p:cBhvr>
+                                      <p:to>
+                                        <p:strVal val="visible"/>
+                                      </p:to>
+                                    </p:set>
+                                  </p:childTnLst>
+                                </p:cTn>
+                              </p:par>
+                            </p:childTnLst>
+                          </p:cTn>
+                        </p:par>
+                      </p:childTnLst>
+                    </p:cTn>
+                  </p:par>
+                  <p:par>
+                    <p:cTn id="11" fill="hold">
+                      <p:stCondLst>
+                        <p:cond delay="indefinite"/>
+                      </p:stCondLst>
+                      <p:childTnLst>
+                        <p:par>
+                          <p:cTn id="12" fill="hold">
+                            <p:stCondLst>
+                              <p:cond delay="0"/>
+                            </p:stCondLst>
+                            <p:childTnLst>
+                              <p:par>
+                                <p:cTn id="13" presetID="1" presetClass="entr" presetSubtype="0" fill="hold" grpId="0" nodeType="clickEffect">
+                                  <p:stCondLst>
+                                    <p:cond delay="0"/>
+                                  </p:stCondLst>
+                                  <p:childTnLst>
+                                    <p:set>
+                                      <p:cBhvr>
+                                        <p:cTn id="14" dur="1" fill="hold">
+                                          <p:stCondLst>
+                                            <p:cond delay="0"/>
+                                          </p:stCondLst>
+                                        </p:cTn>
+                                        <p:tgtEl>
+                                          <p:spTgt spid="8">
+                                            <p:txEl>
+                                              <p:pRg st="2" end="2"/>
+                                            </p:txEl>
+                                          </p:spTgt>
+                                        </p:tgtEl>
+                                        <p:attrNameLst>
+                                          <p:attrName>style.visibility</p:attrName>
+                                        </p:attrNameLst>
+                                      </p:cBhvr>
+                                      <p:to>
+                                        <p:strVal val="visible"/>
+                                      </p:to>
+                                    </p:set>
+                                  </p:childTnLst>
+                                </p:cTn>
+                              </p:par>
+                            </p:childTnLst>
+                          </p:cTn>
+                        </p:par>
+                      </p:childTnLst>
+                    </p:cTn>
+                  </p:par>
+                </p:childTnLst>
+              </p:cTn>
+              <p:prevCondLst>
+                <p:cond evt="onPrev" delay="0">
+                  <p:tgtEl>
+                    <p:sldTgt/>
+                  </p:tgtEl>
+                </p:cond>
+              </p:prevCondLst>
+              <p:nextCondLst>
+                <p:cond evt="onNext" delay="0">
+                  <p:tgtEl>
+                    <p:sldTgt/>
+                  </p:tgtEl>
+                </p:cond>
+              </p:nextCondLst>
+            </p:seq>
+          </p:childTnLst>
+        </p:cTn>
       </p:par>
     </p:tnLst>
+    <p:bldLst>
+      <p:bldP spid="8" grpId="0" build="p"/>
+    </p:bldLst>
   </p:timing>
 </p:sld>
 </file>
@@ -7247,9 +10311,182 @@
   <p:timing>
     <p:tnLst>
       <p:par>
-        <p:cTn id="1" dur="indefinite" restart="never" nodeType="tmRoot"/>
+        <p:cTn id="1" dur="indefinite" restart="never" nodeType="tmRoot">
+          <p:childTnLst>
+            <p:seq concurrent="1" nextAc="seek">
+              <p:cTn id="2" dur="indefinite" nodeType="mainSeq">
+                <p:childTnLst>
+                  <p:par>
+                    <p:cTn id="3" fill="hold">
+                      <p:stCondLst>
+                        <p:cond delay="indefinite"/>
+                      </p:stCondLst>
+                      <p:childTnLst>
+                        <p:par>
+                          <p:cTn id="4" fill="hold">
+                            <p:stCondLst>
+                              <p:cond delay="0"/>
+                            </p:stCondLst>
+                            <p:childTnLst>
+                              <p:par>
+                                <p:cTn id="5" presetID="1" presetClass="entr" presetSubtype="0" fill="hold" grpId="0" nodeType="clickEffect">
+                                  <p:stCondLst>
+                                    <p:cond delay="0"/>
+                                  </p:stCondLst>
+                                  <p:childTnLst>
+                                    <p:set>
+                                      <p:cBhvr>
+                                        <p:cTn id="6" dur="1" fill="hold">
+                                          <p:stCondLst>
+                                            <p:cond delay="0"/>
+                                          </p:stCondLst>
+                                        </p:cTn>
+                                        <p:tgtEl>
+                                          <p:spTgt spid="8">
+                                            <p:txEl>
+                                              <p:pRg st="0" end="0"/>
+                                            </p:txEl>
+                                          </p:spTgt>
+                                        </p:tgtEl>
+                                        <p:attrNameLst>
+                                          <p:attrName>style.visibility</p:attrName>
+                                        </p:attrNameLst>
+                                      </p:cBhvr>
+                                      <p:to>
+                                        <p:strVal val="visible"/>
+                                      </p:to>
+                                    </p:set>
+                                  </p:childTnLst>
+                                </p:cTn>
+                              </p:par>
+                            </p:childTnLst>
+                          </p:cTn>
+                        </p:par>
+                      </p:childTnLst>
+                    </p:cTn>
+                  </p:par>
+                  <p:par>
+                    <p:cTn id="7" fill="hold">
+                      <p:stCondLst>
+                        <p:cond delay="indefinite"/>
+                      </p:stCondLst>
+                      <p:childTnLst>
+                        <p:par>
+                          <p:cTn id="8" fill="hold">
+                            <p:stCondLst>
+                              <p:cond delay="0"/>
+                            </p:stCondLst>
+                            <p:childTnLst>
+                              <p:par>
+                                <p:cTn id="9" presetID="1" presetClass="entr" presetSubtype="0" fill="hold" grpId="0" nodeType="clickEffect">
+                                  <p:stCondLst>
+                                    <p:cond delay="0"/>
+                                  </p:stCondLst>
+                                  <p:childTnLst>
+                                    <p:set>
+                                      <p:cBhvr>
+                                        <p:cTn id="10" dur="1" fill="hold">
+                                          <p:stCondLst>
+                                            <p:cond delay="0"/>
+                                          </p:stCondLst>
+                                        </p:cTn>
+                                        <p:tgtEl>
+                                          <p:spTgt spid="8">
+                                            <p:txEl>
+                                              <p:pRg st="1" end="1"/>
+                                            </p:txEl>
+                                          </p:spTgt>
+                                        </p:tgtEl>
+                                        <p:attrNameLst>
+                                          <p:attrName>style.visibility</p:attrName>
+                                        </p:attrNameLst>
+                                      </p:cBhvr>
+                                      <p:to>
+                                        <p:strVal val="visible"/>
+                                      </p:to>
+                                    </p:set>
+                                  </p:childTnLst>
+                                </p:cTn>
+                              </p:par>
+                            </p:childTnLst>
+                          </p:cTn>
+                        </p:par>
+                      </p:childTnLst>
+                    </p:cTn>
+                  </p:par>
+                  <p:par>
+                    <p:cTn id="11" fill="hold">
+                      <p:stCondLst>
+                        <p:cond delay="indefinite"/>
+                      </p:stCondLst>
+                      <p:childTnLst>
+                        <p:par>
+                          <p:cTn id="12" fill="hold">
+                            <p:stCondLst>
+                              <p:cond delay="0"/>
+                            </p:stCondLst>
+                            <p:childTnLst>
+                              <p:par>
+                                <p:cTn id="13" presetID="1" presetClass="entr" presetSubtype="0" fill="hold" grpId="0" nodeType="clickEffect">
+                                  <p:stCondLst>
+                                    <p:cond delay="0"/>
+                                  </p:stCondLst>
+                                  <p:childTnLst>
+                                    <p:set>
+                                      <p:cBhvr>
+                                        <p:cTn id="14" dur="1" fill="hold">
+                                          <p:stCondLst>
+                                            <p:cond delay="0"/>
+                                          </p:stCondLst>
+                                        </p:cTn>
+                                        <p:tgtEl>
+                                          <p:spTgt spid="8">
+                                            <p:txEl>
+                                              <p:pRg st="2" end="2"/>
+                                            </p:txEl>
+                                          </p:spTgt>
+                                        </p:tgtEl>
+                                        <p:attrNameLst>
+                                          <p:attrName>style.visibility</p:attrName>
+                                        </p:attrNameLst>
+                                      </p:cBhvr>
+                                      <p:to>
+                                        <p:strVal val="visible"/>
+                                      </p:to>
+                                    </p:set>
+                                  </p:childTnLst>
+                                </p:cTn>
+                              </p:par>
+                            </p:childTnLst>
+                          </p:cTn>
+                        </p:par>
+                      </p:childTnLst>
+                    </p:cTn>
+                  </p:par>
+                </p:childTnLst>
+              </p:cTn>
+              <p:prevCondLst>
+                <p:cond evt="onPrev" delay="0">
+                  <p:tgtEl>
+                    <p:sldTgt/>
+                  </p:tgtEl>
+                </p:cond>
+              </p:prevCondLst>
+              <p:nextCondLst>
+                <p:cond evt="onNext" delay="0">
+                  <p:tgtEl>
+                    <p:sldTgt/>
+                  </p:tgtEl>
+                </p:cond>
+              </p:nextCondLst>
+            </p:seq>
+          </p:childTnLst>
+        </p:cTn>
       </p:par>
     </p:tnLst>
+    <p:bldLst>
+      <p:bldP spid="8" grpId="0" build="p"/>
+    </p:bldLst>
   </p:timing>
 </p:sld>
 </file>
@@ -7317,8 +10554,8 @@
           </a:p>
         </p:txBody>
       </p:sp>
-      <mc:AlternateContent xmlns:mc="http://schemas.openxmlformats.org/markup-compatibility/2006">
-        <mc:Choice xmlns:a14="http://schemas.microsoft.com/office/drawing/2010/main" Requires="a14">
+      <mc:AlternateContent xmlns:mc="http://schemas.openxmlformats.org/markup-compatibility/2006" xmlns:a14="http://schemas.microsoft.com/office/drawing/2010/main">
+        <mc:Choice Requires="a14">
           <p:sp>
             <p:nvSpPr>
               <p:cNvPr id="8" name="Content Placeholder 7"/>
@@ -7503,7 +10740,13 @@
                                   <a:rPr lang="en-US" sz="1600" b="0" i="1" smtClean="0">
                                     <a:latin typeface="Cambria Math" panose="02040503050406030204" pitchFamily="18" charset="0"/>
                                   </a:rPr>
-                                  <m:t>, </m:t>
+                                  <m:t>,</m:t>
+                                </m:r>
+                                <m:r>
+                                  <a:rPr lang="en-US" sz="1600" b="0" i="1" smtClean="0">
+                                    <a:latin typeface="Cambria Math" panose="02040503050406030204" pitchFamily="18" charset="0"/>
+                                  </a:rPr>
+                                  <m:t> </m:t>
                                 </m:r>
                                 <m:d>
                                   <m:dPr>
@@ -7765,7 +11008,7 @@
             </p:txBody>
           </p:sp>
         </mc:Choice>
-        <mc:Fallback>
+        <mc:Fallback xmlns="">
           <p:sp>
             <p:nvSpPr>
               <p:cNvPr id="8" name="Content Placeholder 7"/>
@@ -7822,8 +11065,8 @@
           </a:p>
         </p:txBody>
       </p:sp>
-      <mc:AlternateContent xmlns:mc="http://schemas.openxmlformats.org/markup-compatibility/2006">
-        <mc:Choice xmlns:a14="http://schemas.microsoft.com/office/drawing/2010/main" Requires="a14">
+      <mc:AlternateContent xmlns:mc="http://schemas.openxmlformats.org/markup-compatibility/2006" xmlns:a14="http://schemas.microsoft.com/office/drawing/2010/main">
+        <mc:Choice Requires="a14">
           <p:sp>
             <p:nvSpPr>
               <p:cNvPr id="10" name="Content Placeholder 9"/>
@@ -8324,7 +11567,7 @@
             </p:txBody>
           </p:sp>
         </mc:Choice>
-        <mc:Fallback>
+        <mc:Fallback xmlns="">
           <p:sp>
             <p:nvSpPr>
               <p:cNvPr id="10" name="Content Placeholder 9"/>
@@ -8437,9 +11680,283 @@
   <p:timing>
     <p:tnLst>
       <p:par>
-        <p:cTn id="1" dur="indefinite" restart="never" nodeType="tmRoot"/>
+        <p:cTn id="1" dur="indefinite" restart="never" nodeType="tmRoot">
+          <p:childTnLst>
+            <p:seq concurrent="1" nextAc="seek">
+              <p:cTn id="2" dur="indefinite" nodeType="mainSeq">
+                <p:childTnLst>
+                  <p:par>
+                    <p:cTn id="3" fill="hold">
+                      <p:stCondLst>
+                        <p:cond delay="indefinite"/>
+                      </p:stCondLst>
+                      <p:childTnLst>
+                        <p:par>
+                          <p:cTn id="4" fill="hold">
+                            <p:stCondLst>
+                              <p:cond delay="0"/>
+                            </p:stCondLst>
+                            <p:childTnLst>
+                              <p:par>
+                                <p:cTn id="5" presetID="1" presetClass="entr" presetSubtype="0" fill="hold" grpId="0" nodeType="clickEffect">
+                                  <p:stCondLst>
+                                    <p:cond delay="0"/>
+                                  </p:stCondLst>
+                                  <p:childTnLst>
+                                    <p:set>
+                                      <p:cBhvr>
+                                        <p:cTn id="6" dur="1" fill="hold">
+                                          <p:stCondLst>
+                                            <p:cond delay="0"/>
+                                          </p:stCondLst>
+                                        </p:cTn>
+                                        <p:tgtEl>
+                                          <p:spTgt spid="7">
+                                            <p:txEl>
+                                              <p:pRg st="0" end="0"/>
+                                            </p:txEl>
+                                          </p:spTgt>
+                                        </p:tgtEl>
+                                        <p:attrNameLst>
+                                          <p:attrName>style.visibility</p:attrName>
+                                        </p:attrNameLst>
+                                      </p:cBhvr>
+                                      <p:to>
+                                        <p:strVal val="visible"/>
+                                      </p:to>
+                                    </p:set>
+                                  </p:childTnLst>
+                                </p:cTn>
+                              </p:par>
+                            </p:childTnLst>
+                          </p:cTn>
+                        </p:par>
+                      </p:childTnLst>
+                    </p:cTn>
+                  </p:par>
+                  <p:par>
+                    <p:cTn id="7" fill="hold">
+                      <p:stCondLst>
+                        <p:cond delay="indefinite"/>
+                      </p:stCondLst>
+                      <p:childTnLst>
+                        <p:par>
+                          <p:cTn id="8" fill="hold">
+                            <p:stCondLst>
+                              <p:cond delay="0"/>
+                            </p:stCondLst>
+                            <p:childTnLst>
+                              <p:par>
+                                <p:cTn id="9" presetID="1" presetClass="entr" presetSubtype="0" fill="hold" grpId="0" nodeType="clickEffect">
+                                  <p:stCondLst>
+                                    <p:cond delay="0"/>
+                                  </p:stCondLst>
+                                  <p:childTnLst>
+                                    <p:set>
+                                      <p:cBhvr>
+                                        <p:cTn id="10" dur="1" fill="hold">
+                                          <p:stCondLst>
+                                            <p:cond delay="0"/>
+                                          </p:stCondLst>
+                                        </p:cTn>
+                                        <p:tgtEl>
+                                          <p:spTgt spid="8">
+                                            <p:txEl>
+                                              <p:pRg st="0" end="0"/>
+                                            </p:txEl>
+                                          </p:spTgt>
+                                        </p:tgtEl>
+                                        <p:attrNameLst>
+                                          <p:attrName>style.visibility</p:attrName>
+                                        </p:attrNameLst>
+                                      </p:cBhvr>
+                                      <p:to>
+                                        <p:strVal val="visible"/>
+                                      </p:to>
+                                    </p:set>
+                                  </p:childTnLst>
+                                </p:cTn>
+                              </p:par>
+                            </p:childTnLst>
+                          </p:cTn>
+                        </p:par>
+                      </p:childTnLst>
+                    </p:cTn>
+                  </p:par>
+                  <p:par>
+                    <p:cTn id="11" fill="hold">
+                      <p:stCondLst>
+                        <p:cond delay="indefinite"/>
+                      </p:stCondLst>
+                      <p:childTnLst>
+                        <p:par>
+                          <p:cTn id="12" fill="hold">
+                            <p:stCondLst>
+                              <p:cond delay="0"/>
+                            </p:stCondLst>
+                            <p:childTnLst>
+                              <p:par>
+                                <p:cTn id="13" presetID="1" presetClass="entr" presetSubtype="0" fill="hold" grpId="0" nodeType="clickEffect">
+                                  <p:stCondLst>
+                                    <p:cond delay="0"/>
+                                  </p:stCondLst>
+                                  <p:childTnLst>
+                                    <p:set>
+                                      <p:cBhvr>
+                                        <p:cTn id="14" dur="1" fill="hold">
+                                          <p:stCondLst>
+                                            <p:cond delay="0"/>
+                                          </p:stCondLst>
+                                        </p:cTn>
+                                        <p:tgtEl>
+                                          <p:spTgt spid="8">
+                                            <p:txEl>
+                                              <p:pRg st="3" end="3"/>
+                                            </p:txEl>
+                                          </p:spTgt>
+                                        </p:tgtEl>
+                                        <p:attrNameLst>
+                                          <p:attrName>style.visibility</p:attrName>
+                                        </p:attrNameLst>
+                                      </p:cBhvr>
+                                      <p:to>
+                                        <p:strVal val="visible"/>
+                                      </p:to>
+                                    </p:set>
+                                  </p:childTnLst>
+                                </p:cTn>
+                              </p:par>
+                            </p:childTnLst>
+                          </p:cTn>
+                        </p:par>
+                      </p:childTnLst>
+                    </p:cTn>
+                  </p:par>
+                  <p:par>
+                    <p:cTn id="15" fill="hold">
+                      <p:stCondLst>
+                        <p:cond delay="indefinite"/>
+                      </p:stCondLst>
+                      <p:childTnLst>
+                        <p:par>
+                          <p:cTn id="16" fill="hold">
+                            <p:stCondLst>
+                              <p:cond delay="0"/>
+                            </p:stCondLst>
+                            <p:childTnLst>
+                              <p:par>
+                                <p:cTn id="17" presetID="1" presetClass="entr" presetSubtype="0" fill="hold" grpId="0" nodeType="clickEffect">
+                                  <p:stCondLst>
+                                    <p:cond delay="0"/>
+                                  </p:stCondLst>
+                                  <p:childTnLst>
+                                    <p:set>
+                                      <p:cBhvr>
+                                        <p:cTn id="18" dur="1" fill="hold">
+                                          <p:stCondLst>
+                                            <p:cond delay="0"/>
+                                          </p:stCondLst>
+                                        </p:cTn>
+                                        <p:tgtEl>
+                                          <p:spTgt spid="9">
+                                            <p:txEl>
+                                              <p:pRg st="0" end="0"/>
+                                            </p:txEl>
+                                          </p:spTgt>
+                                        </p:tgtEl>
+                                        <p:attrNameLst>
+                                          <p:attrName>style.visibility</p:attrName>
+                                        </p:attrNameLst>
+                                      </p:cBhvr>
+                                      <p:to>
+                                        <p:strVal val="visible"/>
+                                      </p:to>
+                                    </p:set>
+                                  </p:childTnLst>
+                                </p:cTn>
+                              </p:par>
+                            </p:childTnLst>
+                          </p:cTn>
+                        </p:par>
+                      </p:childTnLst>
+                    </p:cTn>
+                  </p:par>
+                  <p:par>
+                    <p:cTn id="19" fill="hold">
+                      <p:stCondLst>
+                        <p:cond delay="indefinite"/>
+                      </p:stCondLst>
+                      <p:childTnLst>
+                        <p:par>
+                          <p:cTn id="20" fill="hold">
+                            <p:stCondLst>
+                              <p:cond delay="0"/>
+                            </p:stCondLst>
+                            <p:childTnLst>
+                              <p:par>
+                                <p:cTn id="21" presetID="1" presetClass="entr" presetSubtype="0" fill="hold" grpId="0" nodeType="clickEffect">
+                                  <p:stCondLst>
+                                    <p:cond delay="0"/>
+                                  </p:stCondLst>
+                                  <p:childTnLst>
+                                    <p:set>
+                                      <p:cBhvr>
+                                        <p:cTn id="22" dur="1" fill="hold">
+                                          <p:stCondLst>
+                                            <p:cond delay="0"/>
+                                          </p:stCondLst>
+                                        </p:cTn>
+                                        <p:tgtEl>
+                                          <p:spTgt spid="10">
+                                            <p:txEl>
+                                              <p:pRg st="0" end="0"/>
+                                            </p:txEl>
+                                          </p:spTgt>
+                                        </p:tgtEl>
+                                        <p:attrNameLst>
+                                          <p:attrName>style.visibility</p:attrName>
+                                        </p:attrNameLst>
+                                      </p:cBhvr>
+                                      <p:to>
+                                        <p:strVal val="visible"/>
+                                      </p:to>
+                                    </p:set>
+                                  </p:childTnLst>
+                                </p:cTn>
+                              </p:par>
+                            </p:childTnLst>
+                          </p:cTn>
+                        </p:par>
+                      </p:childTnLst>
+                    </p:cTn>
+                  </p:par>
+                </p:childTnLst>
+              </p:cTn>
+              <p:prevCondLst>
+                <p:cond evt="onPrev" delay="0">
+                  <p:tgtEl>
+                    <p:sldTgt/>
+                  </p:tgtEl>
+                </p:cond>
+              </p:prevCondLst>
+              <p:nextCondLst>
+                <p:cond evt="onNext" delay="0">
+                  <p:tgtEl>
+                    <p:sldTgt/>
+                  </p:tgtEl>
+                </p:cond>
+              </p:nextCondLst>
+            </p:seq>
+          </p:childTnLst>
+        </p:cTn>
       </p:par>
     </p:tnLst>
+    <p:bldLst>
+      <p:bldP spid="7" grpId="0" build="p"/>
+      <p:bldP spid="8" grpId="0" build="p"/>
+      <p:bldP spid="9" grpId="0" build="p"/>
+      <p:bldP spid="10" grpId="0" build="p"/>
+    </p:bldLst>
   </p:timing>
 </p:sld>
 </file>
@@ -8519,11 +12036,7 @@
           <a:p>
             <a:r>
               <a:rPr lang="en-US" sz="2400" dirty="0" smtClean="0"/>
-              <a:t>In typical system, linear samples of 14 to 16 bits are companded to 8 </a:t>
-            </a:r>
-            <a:r>
-              <a:rPr lang="en-US" sz="2400" dirty="0" smtClean="0"/>
-              <a:t>bits</a:t>
+              <a:t>In typical system, linear samples of 14 to 16 bits are companded to 8 bits</a:t>
             </a:r>
           </a:p>
           <a:p>
@@ -8614,9 +12127,280 @@
   <p:timing>
     <p:tnLst>
       <p:par>
-        <p:cTn id="1" dur="indefinite" restart="never" nodeType="tmRoot"/>
+        <p:cTn id="1" dur="indefinite" restart="never" nodeType="tmRoot">
+          <p:childTnLst>
+            <p:seq concurrent="1" nextAc="seek">
+              <p:cTn id="2" dur="indefinite" nodeType="mainSeq">
+                <p:childTnLst>
+                  <p:par>
+                    <p:cTn id="3" fill="hold">
+                      <p:stCondLst>
+                        <p:cond delay="indefinite"/>
+                      </p:stCondLst>
+                      <p:childTnLst>
+                        <p:par>
+                          <p:cTn id="4" fill="hold">
+                            <p:stCondLst>
+                              <p:cond delay="0"/>
+                            </p:stCondLst>
+                            <p:childTnLst>
+                              <p:par>
+                                <p:cTn id="5" presetID="1" presetClass="entr" presetSubtype="0" fill="hold" grpId="0" nodeType="clickEffect">
+                                  <p:stCondLst>
+                                    <p:cond delay="0"/>
+                                  </p:stCondLst>
+                                  <p:childTnLst>
+                                    <p:set>
+                                      <p:cBhvr>
+                                        <p:cTn id="6" dur="1" fill="hold">
+                                          <p:stCondLst>
+                                            <p:cond delay="0"/>
+                                          </p:stCondLst>
+                                        </p:cTn>
+                                        <p:tgtEl>
+                                          <p:spTgt spid="3">
+                                            <p:txEl>
+                                              <p:pRg st="0" end="0"/>
+                                            </p:txEl>
+                                          </p:spTgt>
+                                        </p:tgtEl>
+                                        <p:attrNameLst>
+                                          <p:attrName>style.visibility</p:attrName>
+                                        </p:attrNameLst>
+                                      </p:cBhvr>
+                                      <p:to>
+                                        <p:strVal val="visible"/>
+                                      </p:to>
+                                    </p:set>
+                                  </p:childTnLst>
+                                </p:cTn>
+                              </p:par>
+                            </p:childTnLst>
+                          </p:cTn>
+                        </p:par>
+                      </p:childTnLst>
+                    </p:cTn>
+                  </p:par>
+                  <p:par>
+                    <p:cTn id="7" fill="hold">
+                      <p:stCondLst>
+                        <p:cond delay="indefinite"/>
+                      </p:stCondLst>
+                      <p:childTnLst>
+                        <p:par>
+                          <p:cTn id="8" fill="hold">
+                            <p:stCondLst>
+                              <p:cond delay="0"/>
+                            </p:stCondLst>
+                            <p:childTnLst>
+                              <p:par>
+                                <p:cTn id="9" presetID="1" presetClass="entr" presetSubtype="0" fill="hold" grpId="0" nodeType="clickEffect">
+                                  <p:stCondLst>
+                                    <p:cond delay="0"/>
+                                  </p:stCondLst>
+                                  <p:childTnLst>
+                                    <p:set>
+                                      <p:cBhvr>
+                                        <p:cTn id="10" dur="1" fill="hold">
+                                          <p:stCondLst>
+                                            <p:cond delay="0"/>
+                                          </p:stCondLst>
+                                        </p:cTn>
+                                        <p:tgtEl>
+                                          <p:spTgt spid="3">
+                                            <p:txEl>
+                                              <p:pRg st="1" end="1"/>
+                                            </p:txEl>
+                                          </p:spTgt>
+                                        </p:tgtEl>
+                                        <p:attrNameLst>
+                                          <p:attrName>style.visibility</p:attrName>
+                                        </p:attrNameLst>
+                                      </p:cBhvr>
+                                      <p:to>
+                                        <p:strVal val="visible"/>
+                                      </p:to>
+                                    </p:set>
+                                  </p:childTnLst>
+                                </p:cTn>
+                              </p:par>
+                            </p:childTnLst>
+                          </p:cTn>
+                        </p:par>
+                      </p:childTnLst>
+                    </p:cTn>
+                  </p:par>
+                  <p:par>
+                    <p:cTn id="11" fill="hold">
+                      <p:stCondLst>
+                        <p:cond delay="indefinite"/>
+                      </p:stCondLst>
+                      <p:childTnLst>
+                        <p:par>
+                          <p:cTn id="12" fill="hold">
+                            <p:stCondLst>
+                              <p:cond delay="0"/>
+                            </p:stCondLst>
+                            <p:childTnLst>
+                              <p:par>
+                                <p:cTn id="13" presetID="1" presetClass="entr" presetSubtype="0" fill="hold" grpId="0" nodeType="clickEffect">
+                                  <p:stCondLst>
+                                    <p:cond delay="0"/>
+                                  </p:stCondLst>
+                                  <p:childTnLst>
+                                    <p:set>
+                                      <p:cBhvr>
+                                        <p:cTn id="14" dur="1" fill="hold">
+                                          <p:stCondLst>
+                                            <p:cond delay="0"/>
+                                          </p:stCondLst>
+                                        </p:cTn>
+                                        <p:tgtEl>
+                                          <p:spTgt spid="3">
+                                            <p:txEl>
+                                              <p:pRg st="2" end="2"/>
+                                            </p:txEl>
+                                          </p:spTgt>
+                                        </p:tgtEl>
+                                        <p:attrNameLst>
+                                          <p:attrName>style.visibility</p:attrName>
+                                        </p:attrNameLst>
+                                      </p:cBhvr>
+                                      <p:to>
+                                        <p:strVal val="visible"/>
+                                      </p:to>
+                                    </p:set>
+                                  </p:childTnLst>
+                                </p:cTn>
+                              </p:par>
+                            </p:childTnLst>
+                          </p:cTn>
+                        </p:par>
+                      </p:childTnLst>
+                    </p:cTn>
+                  </p:par>
+                  <p:par>
+                    <p:cTn id="15" fill="hold">
+                      <p:stCondLst>
+                        <p:cond delay="indefinite"/>
+                      </p:stCondLst>
+                      <p:childTnLst>
+                        <p:par>
+                          <p:cTn id="16" fill="hold">
+                            <p:stCondLst>
+                              <p:cond delay="0"/>
+                            </p:stCondLst>
+                            <p:childTnLst>
+                              <p:par>
+                                <p:cTn id="17" presetID="1" presetClass="entr" presetSubtype="0" fill="hold" grpId="0" nodeType="clickEffect">
+                                  <p:stCondLst>
+                                    <p:cond delay="0"/>
+                                  </p:stCondLst>
+                                  <p:childTnLst>
+                                    <p:set>
+                                      <p:cBhvr>
+                                        <p:cTn id="18" dur="1" fill="hold">
+                                          <p:stCondLst>
+                                            <p:cond delay="0"/>
+                                          </p:stCondLst>
+                                        </p:cTn>
+                                        <p:tgtEl>
+                                          <p:spTgt spid="3">
+                                            <p:txEl>
+                                              <p:pRg st="3" end="3"/>
+                                            </p:txEl>
+                                          </p:spTgt>
+                                        </p:tgtEl>
+                                        <p:attrNameLst>
+                                          <p:attrName>style.visibility</p:attrName>
+                                        </p:attrNameLst>
+                                      </p:cBhvr>
+                                      <p:to>
+                                        <p:strVal val="visible"/>
+                                      </p:to>
+                                    </p:set>
+                                  </p:childTnLst>
+                                </p:cTn>
+                              </p:par>
+                            </p:childTnLst>
+                          </p:cTn>
+                        </p:par>
+                      </p:childTnLst>
+                    </p:cTn>
+                  </p:par>
+                  <p:par>
+                    <p:cTn id="19" fill="hold">
+                      <p:stCondLst>
+                        <p:cond delay="indefinite"/>
+                      </p:stCondLst>
+                      <p:childTnLst>
+                        <p:par>
+                          <p:cTn id="20" fill="hold">
+                            <p:stCondLst>
+                              <p:cond delay="0"/>
+                            </p:stCondLst>
+                            <p:childTnLst>
+                              <p:par>
+                                <p:cTn id="21" presetID="1" presetClass="entr" presetSubtype="0" fill="hold" grpId="0" nodeType="clickEffect">
+                                  <p:stCondLst>
+                                    <p:cond delay="0"/>
+                                  </p:stCondLst>
+                                  <p:childTnLst>
+                                    <p:set>
+                                      <p:cBhvr>
+                                        <p:cTn id="22" dur="1" fill="hold">
+                                          <p:stCondLst>
+                                            <p:cond delay="0"/>
+                                          </p:stCondLst>
+                                        </p:cTn>
+                                        <p:tgtEl>
+                                          <p:spTgt spid="3">
+                                            <p:txEl>
+                                              <p:pRg st="4" end="4"/>
+                                            </p:txEl>
+                                          </p:spTgt>
+                                        </p:tgtEl>
+                                        <p:attrNameLst>
+                                          <p:attrName>style.visibility</p:attrName>
+                                        </p:attrNameLst>
+                                      </p:cBhvr>
+                                      <p:to>
+                                        <p:strVal val="visible"/>
+                                      </p:to>
+                                    </p:set>
+                                  </p:childTnLst>
+                                </p:cTn>
+                              </p:par>
+                            </p:childTnLst>
+                          </p:cTn>
+                        </p:par>
+                      </p:childTnLst>
+                    </p:cTn>
+                  </p:par>
+                </p:childTnLst>
+              </p:cTn>
+              <p:prevCondLst>
+                <p:cond evt="onPrev" delay="0">
+                  <p:tgtEl>
+                    <p:sldTgt/>
+                  </p:tgtEl>
+                </p:cond>
+              </p:prevCondLst>
+              <p:nextCondLst>
+                <p:cond evt="onNext" delay="0">
+                  <p:tgtEl>
+                    <p:sldTgt/>
+                  </p:tgtEl>
+                </p:cond>
+              </p:nextCondLst>
+            </p:seq>
+          </p:childTnLst>
+        </p:cTn>
       </p:par>
     </p:tnLst>
+    <p:bldLst>
+      <p:bldP spid="3" grpId="0" build="p"/>
+    </p:bldLst>
   </p:timing>
 </p:sld>
 </file>
@@ -8655,11 +12439,7 @@
           <a:p>
             <a:r>
               <a:rPr lang="en-US" dirty="0" smtClean="0"/>
-              <a:t>U-law </a:t>
-            </a:r>
-            <a:r>
-              <a:rPr lang="en-US" dirty="0" smtClean="0"/>
-              <a:t>1</a:t>
+              <a:t>U-law 1</a:t>
             </a:r>
             <a:endParaRPr lang="en-US" dirty="0"/>
           </a:p>
@@ -8692,8 +12472,8 @@
           </a:p>
         </p:txBody>
       </p:sp>
-      <mc:AlternateContent xmlns:mc="http://schemas.openxmlformats.org/markup-compatibility/2006">
-        <mc:Choice xmlns:a14="http://schemas.microsoft.com/office/drawing/2010/main" Requires="a14">
+      <mc:AlternateContent xmlns:mc="http://schemas.openxmlformats.org/markup-compatibility/2006" xmlns:a14="http://schemas.microsoft.com/office/drawing/2010/main">
+        <mc:Choice Requires="a14">
           <p:sp>
             <p:nvSpPr>
               <p:cNvPr id="3" name="Content Placeholder 2"/>
@@ -8993,7 +12773,7 @@
             </p:txBody>
           </p:sp>
         </mc:Choice>
-        <mc:Fallback>
+        <mc:Fallback xmlns="">
           <p:sp>
             <p:nvSpPr>
               <p:cNvPr id="3" name="Content Placeholder 2"/>
@@ -9058,8 +12838,8 @@
           </a:p>
         </p:txBody>
       </p:sp>
-      <mc:AlternateContent xmlns:mc="http://schemas.openxmlformats.org/markup-compatibility/2006">
-        <mc:Choice xmlns:a14="http://schemas.microsoft.com/office/drawing/2010/main" Requires="a14">
+      <mc:AlternateContent xmlns:mc="http://schemas.openxmlformats.org/markup-compatibility/2006" xmlns:a14="http://schemas.microsoft.com/office/drawing/2010/main">
+        <mc:Choice Requires="a14">
           <p:sp>
             <p:nvSpPr>
               <p:cNvPr id="7" name="Content Placeholder 6"/>
@@ -9294,7 +13074,7 @@
             </p:txBody>
           </p:sp>
         </mc:Choice>
-        <mc:Fallback>
+        <mc:Fallback xmlns="">
           <p:sp>
             <p:nvSpPr>
               <p:cNvPr id="7" name="Content Placeholder 6"/>
@@ -9411,9 +13191,381 @@
   <p:timing>
     <p:tnLst>
       <p:par>
-        <p:cTn id="1" dur="indefinite" restart="never" nodeType="tmRoot"/>
+        <p:cTn id="1" dur="indefinite" restart="never" nodeType="tmRoot">
+          <p:childTnLst>
+            <p:seq concurrent="1" nextAc="seek">
+              <p:cTn id="2" dur="indefinite" nodeType="mainSeq">
+                <p:childTnLst>
+                  <p:par>
+                    <p:cTn id="3" fill="hold">
+                      <p:stCondLst>
+                        <p:cond delay="indefinite"/>
+                      </p:stCondLst>
+                      <p:childTnLst>
+                        <p:par>
+                          <p:cTn id="4" fill="hold">
+                            <p:stCondLst>
+                              <p:cond delay="0"/>
+                            </p:stCondLst>
+                            <p:childTnLst>
+                              <p:par>
+                                <p:cTn id="5" presetID="1" presetClass="entr" presetSubtype="0" fill="hold" grpId="0" nodeType="clickEffect">
+                                  <p:stCondLst>
+                                    <p:cond delay="0"/>
+                                  </p:stCondLst>
+                                  <p:childTnLst>
+                                    <p:set>
+                                      <p:cBhvr>
+                                        <p:cTn id="6" dur="1" fill="hold">
+                                          <p:stCondLst>
+                                            <p:cond delay="0"/>
+                                          </p:stCondLst>
+                                        </p:cTn>
+                                        <p:tgtEl>
+                                          <p:spTgt spid="8">
+                                            <p:txEl>
+                                              <p:pRg st="0" end="0"/>
+                                            </p:txEl>
+                                          </p:spTgt>
+                                        </p:tgtEl>
+                                        <p:attrNameLst>
+                                          <p:attrName>style.visibility</p:attrName>
+                                        </p:attrNameLst>
+                                      </p:cBhvr>
+                                      <p:to>
+                                        <p:strVal val="visible"/>
+                                      </p:to>
+                                    </p:set>
+                                  </p:childTnLst>
+                                </p:cTn>
+                              </p:par>
+                            </p:childTnLst>
+                          </p:cTn>
+                        </p:par>
+                      </p:childTnLst>
+                    </p:cTn>
+                  </p:par>
+                  <p:par>
+                    <p:cTn id="7" fill="hold">
+                      <p:stCondLst>
+                        <p:cond delay="indefinite"/>
+                      </p:stCondLst>
+                      <p:childTnLst>
+                        <p:par>
+                          <p:cTn id="8" fill="hold">
+                            <p:stCondLst>
+                              <p:cond delay="0"/>
+                            </p:stCondLst>
+                            <p:childTnLst>
+                              <p:par>
+                                <p:cTn id="9" presetID="1" presetClass="entr" presetSubtype="0" fill="hold" grpId="0" nodeType="clickEffect">
+                                  <p:stCondLst>
+                                    <p:cond delay="0"/>
+                                  </p:stCondLst>
+                                  <p:childTnLst>
+                                    <p:set>
+                                      <p:cBhvr>
+                                        <p:cTn id="10" dur="1" fill="hold">
+                                          <p:stCondLst>
+                                            <p:cond delay="0"/>
+                                          </p:stCondLst>
+                                        </p:cTn>
+                                        <p:tgtEl>
+                                          <p:spTgt spid="3">
+                                            <p:txEl>
+                                              <p:pRg st="1" end="1"/>
+                                            </p:txEl>
+                                          </p:spTgt>
+                                        </p:tgtEl>
+                                        <p:attrNameLst>
+                                          <p:attrName>style.visibility</p:attrName>
+                                        </p:attrNameLst>
+                                      </p:cBhvr>
+                                      <p:to>
+                                        <p:strVal val="visible"/>
+                                      </p:to>
+                                    </p:set>
+                                  </p:childTnLst>
+                                </p:cTn>
+                              </p:par>
+                            </p:childTnLst>
+                          </p:cTn>
+                        </p:par>
+                      </p:childTnLst>
+                    </p:cTn>
+                  </p:par>
+                  <p:par>
+                    <p:cTn id="11" fill="hold">
+                      <p:stCondLst>
+                        <p:cond delay="indefinite"/>
+                      </p:stCondLst>
+                      <p:childTnLst>
+                        <p:par>
+                          <p:cTn id="12" fill="hold">
+                            <p:stCondLst>
+                              <p:cond delay="0"/>
+                            </p:stCondLst>
+                            <p:childTnLst>
+                              <p:par>
+                                <p:cTn id="13" presetID="1" presetClass="entr" presetSubtype="0" fill="hold" grpId="0" nodeType="clickEffect">
+                                  <p:stCondLst>
+                                    <p:cond delay="0"/>
+                                  </p:stCondLst>
+                                  <p:childTnLst>
+                                    <p:set>
+                                      <p:cBhvr>
+                                        <p:cTn id="14" dur="1" fill="hold">
+                                          <p:stCondLst>
+                                            <p:cond delay="0"/>
+                                          </p:stCondLst>
+                                        </p:cTn>
+                                        <p:tgtEl>
+                                          <p:spTgt spid="3">
+                                            <p:txEl>
+                                              <p:pRg st="2" end="2"/>
+                                            </p:txEl>
+                                          </p:spTgt>
+                                        </p:tgtEl>
+                                        <p:attrNameLst>
+                                          <p:attrName>style.visibility</p:attrName>
+                                        </p:attrNameLst>
+                                      </p:cBhvr>
+                                      <p:to>
+                                        <p:strVal val="visible"/>
+                                      </p:to>
+                                    </p:set>
+                                  </p:childTnLst>
+                                </p:cTn>
+                              </p:par>
+                            </p:childTnLst>
+                          </p:cTn>
+                        </p:par>
+                      </p:childTnLst>
+                    </p:cTn>
+                  </p:par>
+                  <p:par>
+                    <p:cTn id="15" fill="hold">
+                      <p:stCondLst>
+                        <p:cond delay="indefinite"/>
+                      </p:stCondLst>
+                      <p:childTnLst>
+                        <p:par>
+                          <p:cTn id="16" fill="hold">
+                            <p:stCondLst>
+                              <p:cond delay="0"/>
+                            </p:stCondLst>
+                            <p:childTnLst>
+                              <p:par>
+                                <p:cTn id="17" presetID="1" presetClass="entr" presetSubtype="0" fill="hold" grpId="0" nodeType="clickEffect">
+                                  <p:stCondLst>
+                                    <p:cond delay="0"/>
+                                  </p:stCondLst>
+                                  <p:childTnLst>
+                                    <p:set>
+                                      <p:cBhvr>
+                                        <p:cTn id="18" dur="1" fill="hold">
+                                          <p:stCondLst>
+                                            <p:cond delay="0"/>
+                                          </p:stCondLst>
+                                        </p:cTn>
+                                        <p:tgtEl>
+                                          <p:spTgt spid="3">
+                                            <p:txEl>
+                                              <p:pRg st="4" end="4"/>
+                                            </p:txEl>
+                                          </p:spTgt>
+                                        </p:tgtEl>
+                                        <p:attrNameLst>
+                                          <p:attrName>style.visibility</p:attrName>
+                                        </p:attrNameLst>
+                                      </p:cBhvr>
+                                      <p:to>
+                                        <p:strVal val="visible"/>
+                                      </p:to>
+                                    </p:set>
+                                  </p:childTnLst>
+                                </p:cTn>
+                              </p:par>
+                            </p:childTnLst>
+                          </p:cTn>
+                        </p:par>
+                      </p:childTnLst>
+                    </p:cTn>
+                  </p:par>
+                  <p:par>
+                    <p:cTn id="19" fill="hold">
+                      <p:stCondLst>
+                        <p:cond delay="indefinite"/>
+                      </p:stCondLst>
+                      <p:childTnLst>
+                        <p:par>
+                          <p:cTn id="20" fill="hold">
+                            <p:stCondLst>
+                              <p:cond delay="0"/>
+                            </p:stCondLst>
+                            <p:childTnLst>
+                              <p:par>
+                                <p:cTn id="21" presetID="1" presetClass="entr" presetSubtype="0" fill="hold" grpId="0" nodeType="clickEffect">
+                                  <p:stCondLst>
+                                    <p:cond delay="0"/>
+                                  </p:stCondLst>
+                                  <p:childTnLst>
+                                    <p:set>
+                                      <p:cBhvr>
+                                        <p:cTn id="22" dur="1" fill="hold">
+                                          <p:stCondLst>
+                                            <p:cond delay="0"/>
+                                          </p:stCondLst>
+                                        </p:cTn>
+                                        <p:tgtEl>
+                                          <p:spTgt spid="9">
+                                            <p:txEl>
+                                              <p:pRg st="0" end="0"/>
+                                            </p:txEl>
+                                          </p:spTgt>
+                                        </p:tgtEl>
+                                        <p:attrNameLst>
+                                          <p:attrName>style.visibility</p:attrName>
+                                        </p:attrNameLst>
+                                      </p:cBhvr>
+                                      <p:to>
+                                        <p:strVal val="visible"/>
+                                      </p:to>
+                                    </p:set>
+                                  </p:childTnLst>
+                                </p:cTn>
+                              </p:par>
+                            </p:childTnLst>
+                          </p:cTn>
+                        </p:par>
+                      </p:childTnLst>
+                    </p:cTn>
+                  </p:par>
+                  <p:par>
+                    <p:cTn id="23" fill="hold">
+                      <p:stCondLst>
+                        <p:cond delay="indefinite"/>
+                      </p:stCondLst>
+                      <p:childTnLst>
+                        <p:par>
+                          <p:cTn id="24" fill="hold">
+                            <p:stCondLst>
+                              <p:cond delay="0"/>
+                            </p:stCondLst>
+                            <p:childTnLst>
+                              <p:par>
+                                <p:cTn id="25" presetID="1" presetClass="entr" presetSubtype="0" fill="hold" grpId="0" nodeType="clickEffect">
+                                  <p:stCondLst>
+                                    <p:cond delay="0"/>
+                                  </p:stCondLst>
+                                  <p:childTnLst>
+                                    <p:set>
+                                      <p:cBhvr>
+                                        <p:cTn id="26" dur="1" fill="hold">
+                                          <p:stCondLst>
+                                            <p:cond delay="0"/>
+                                          </p:stCondLst>
+                                        </p:cTn>
+                                        <p:tgtEl>
+                                          <p:spTgt spid="7">
+                                            <p:txEl>
+                                              <p:pRg st="1" end="1"/>
+                                            </p:txEl>
+                                          </p:spTgt>
+                                        </p:tgtEl>
+                                        <p:attrNameLst>
+                                          <p:attrName>style.visibility</p:attrName>
+                                        </p:attrNameLst>
+                                      </p:cBhvr>
+                                      <p:to>
+                                        <p:strVal val="visible"/>
+                                      </p:to>
+                                    </p:set>
+                                  </p:childTnLst>
+                                </p:cTn>
+                              </p:par>
+                            </p:childTnLst>
+                          </p:cTn>
+                        </p:par>
+                      </p:childTnLst>
+                    </p:cTn>
+                  </p:par>
+                  <p:par>
+                    <p:cTn id="27" fill="hold">
+                      <p:stCondLst>
+                        <p:cond delay="indefinite"/>
+                      </p:stCondLst>
+                      <p:childTnLst>
+                        <p:par>
+                          <p:cTn id="28" fill="hold">
+                            <p:stCondLst>
+                              <p:cond delay="0"/>
+                            </p:stCondLst>
+                            <p:childTnLst>
+                              <p:par>
+                                <p:cTn id="29" presetID="1" presetClass="entr" presetSubtype="0" fill="hold" grpId="0" nodeType="clickEffect">
+                                  <p:stCondLst>
+                                    <p:cond delay="0"/>
+                                  </p:stCondLst>
+                                  <p:childTnLst>
+                                    <p:set>
+                                      <p:cBhvr>
+                                        <p:cTn id="30" dur="1" fill="hold">
+                                          <p:stCondLst>
+                                            <p:cond delay="0"/>
+                                          </p:stCondLst>
+                                        </p:cTn>
+                                        <p:tgtEl>
+                                          <p:spTgt spid="7">
+                                            <p:txEl>
+                                              <p:pRg st="2" end="2"/>
+                                            </p:txEl>
+                                          </p:spTgt>
+                                        </p:tgtEl>
+                                        <p:attrNameLst>
+                                          <p:attrName>style.visibility</p:attrName>
+                                        </p:attrNameLst>
+                                      </p:cBhvr>
+                                      <p:to>
+                                        <p:strVal val="visible"/>
+                                      </p:to>
+                                    </p:set>
+                                  </p:childTnLst>
+                                </p:cTn>
+                              </p:par>
+                            </p:childTnLst>
+                          </p:cTn>
+                        </p:par>
+                      </p:childTnLst>
+                    </p:cTn>
+                  </p:par>
+                </p:childTnLst>
+              </p:cTn>
+              <p:prevCondLst>
+                <p:cond evt="onPrev" delay="0">
+                  <p:tgtEl>
+                    <p:sldTgt/>
+                  </p:tgtEl>
+                </p:cond>
+              </p:prevCondLst>
+              <p:nextCondLst>
+                <p:cond evt="onNext" delay="0">
+                  <p:tgtEl>
+                    <p:sldTgt/>
+                  </p:tgtEl>
+                </p:cond>
+              </p:nextCondLst>
+            </p:seq>
+          </p:childTnLst>
+        </p:cTn>
       </p:par>
     </p:tnLst>
+    <p:bldLst>
+      <p:bldP spid="8" grpId="0" build="p"/>
+      <p:bldP spid="3" grpId="0" build="p"/>
+      <p:bldP spid="9" grpId="0" build="p"/>
+      <p:bldP spid="7" grpId="0" build="p"/>
+    </p:bldLst>
   </p:timing>
 </p:sld>
 </file>

</xml_diff>